<commit_message>
adding a option on favorites origins
</commit_message>
<xml_diff>
--- a/presentation_soutenance.pptx
+++ b/presentation_soutenance.pptx
@@ -5,20 +5,21 @@
     <p:sldMasterId id="2147483648" r:id="rId2"/>
     <p:sldMasterId id="2147483661" r:id="rId3"/>
     <p:sldMasterId id="2147483674" r:id="rId4"/>
+    <p:sldMasterId id="2147483687" r:id="rId5"/>
   </p:sldMasterIdLst>
   <p:sldIdLst>
-    <p:sldId id="256" r:id="rId5"/>
-    <p:sldId id="257" r:id="rId6"/>
-    <p:sldId id="258" r:id="rId7"/>
-    <p:sldId id="259" r:id="rId8"/>
-    <p:sldId id="260" r:id="rId9"/>
-    <p:sldId id="261" r:id="rId10"/>
-    <p:sldId id="262" r:id="rId11"/>
-    <p:sldId id="263" r:id="rId12"/>
-    <p:sldId id="264" r:id="rId13"/>
-    <p:sldId id="265" r:id="rId14"/>
-    <p:sldId id="266" r:id="rId15"/>
-    <p:sldId id="267" r:id="rId16"/>
+    <p:sldId id="256" r:id="rId6"/>
+    <p:sldId id="257" r:id="rId7"/>
+    <p:sldId id="258" r:id="rId8"/>
+    <p:sldId id="259" r:id="rId9"/>
+    <p:sldId id="260" r:id="rId10"/>
+    <p:sldId id="261" r:id="rId11"/>
+    <p:sldId id="262" r:id="rId12"/>
+    <p:sldId id="263" r:id="rId13"/>
+    <p:sldId id="264" r:id="rId14"/>
+    <p:sldId id="265" r:id="rId15"/>
+    <p:sldId id="266" r:id="rId16"/>
+    <p:sldId id="267" r:id="rId17"/>
   </p:sldIdLst>
   <p:sldSz cx="10080625" cy="5670550"/>
   <p:notesSz cx="7559675" cy="10691812"/>
@@ -4113,6 +4114,221 @@
 </p:sldLayout>
 </file>
 
+<file path=ppt/slideLayouts/slideLayout37.xml><?xml version="1.0" encoding="utf-8"?>
+<p:sldLayout xmlns:a="http://schemas.openxmlformats.org/drawingml/2006/main" xmlns:p="http://schemas.openxmlformats.org/presentationml/2006/main" xmlns:r="http://schemas.openxmlformats.org/officeDocument/2006/relationships" xmlns:p14="http://schemas.microsoft.com/office/powerpoint/2010/main" xmlns:p15="http://schemas.microsoft.com/office/powerpoint/2012/main" xmlns:mc="http://schemas.openxmlformats.org/markup-compatibility/2006" type="blank" preserve="1">
+  <p:cSld name="Blank Slide">
+    <p:spTree>
+      <p:nvGrpSpPr>
+        <p:cNvPr id="1" name=""/>
+        <p:cNvGrpSpPr/>
+        <p:nvPr/>
+      </p:nvGrpSpPr>
+      <p:grpSpPr>
+        <a:xfrm>
+          <a:off x="0" y="0"/>
+          <a:ext cx="0" cy="0"/>
+          <a:chOff x="0" y="0"/>
+          <a:chExt cx="0" cy="0"/>
+        </a:xfrm>
+      </p:grpSpPr>
+    </p:spTree>
+  </p:cSld>
+</p:sldLayout>
+</file>
+
+<file path=ppt/slideLayouts/slideLayout38.xml><?xml version="1.0" encoding="utf-8"?>
+<p:sldLayout xmlns:a="http://schemas.openxmlformats.org/drawingml/2006/main" xmlns:p="http://schemas.openxmlformats.org/presentationml/2006/main" xmlns:r="http://schemas.openxmlformats.org/officeDocument/2006/relationships" xmlns:p14="http://schemas.microsoft.com/office/powerpoint/2010/main" xmlns:p15="http://schemas.microsoft.com/office/powerpoint/2012/main" xmlns:mc="http://schemas.openxmlformats.org/markup-compatibility/2006" type="tx" preserve="1">
+  <p:cSld name="Title Slide">
+    <p:spTree>
+      <p:nvGrpSpPr>
+        <p:cNvPr id="1" name=""/>
+        <p:cNvGrpSpPr/>
+        <p:nvPr/>
+      </p:nvGrpSpPr>
+      <p:grpSpPr>
+        <a:xfrm>
+          <a:off x="0" y="0"/>
+          <a:ext cx="0" cy="0"/>
+          <a:chOff x="0" y="0"/>
+          <a:chExt cx="0" cy="0"/>
+        </a:xfrm>
+      </p:grpSpPr>
+      <p:sp>
+        <p:nvSpPr>
+          <p:cNvPr id="120" name="PlaceHolder 1"/>
+          <p:cNvSpPr>
+            <a:spLocks noGrp="1"/>
+          </p:cNvSpPr>
+          <p:nvPr>
+            <p:ph type="title"/>
+          </p:nvPr>
+        </p:nvSpPr>
+        <p:spPr>
+          <a:xfrm>
+            <a:off x="504000" y="226080"/>
+            <a:ext cx="9072000" cy="946440"/>
+          </a:xfrm>
+          <a:prstGeom prst="rect">
+            <a:avLst/>
+          </a:prstGeom>
+        </p:spPr>
+        <p:txBody>
+          <a:bodyPr lIns="0" rIns="0" tIns="0" bIns="0" anchor="ctr"/>
+          <a:p>
+            <a:pPr algn="ctr"/>
+            <a:endParaRPr b="0" lang="fr-FR" sz="4400" spc="-1" strike="noStrike">
+              <a:solidFill>
+                <a:srgbClr val="000000"/>
+              </a:solidFill>
+              <a:uFill>
+                <a:solidFill>
+                  <a:srgbClr val="ffffff"/>
+                </a:solidFill>
+              </a:uFill>
+              <a:latin typeface="Arial"/>
+            </a:endParaRPr>
+          </a:p>
+        </p:txBody>
+      </p:sp>
+      <p:sp>
+        <p:nvSpPr>
+          <p:cNvPr id="121" name="PlaceHolder 2"/>
+          <p:cNvSpPr>
+            <a:spLocks noGrp="1"/>
+          </p:cNvSpPr>
+          <p:nvPr>
+            <p:ph type="subTitle"/>
+          </p:nvPr>
+        </p:nvSpPr>
+        <p:spPr>
+          <a:xfrm>
+            <a:off x="504000" y="1326600"/>
+            <a:ext cx="9072000" cy="3288600"/>
+          </a:xfrm>
+          <a:prstGeom prst="rect">
+            <a:avLst/>
+          </a:prstGeom>
+        </p:spPr>
+        <p:txBody>
+          <a:bodyPr lIns="0" rIns="0" tIns="0" bIns="0" anchor="ctr"/>
+          <a:p>
+            <a:pPr algn="ctr"/>
+            <a:endParaRPr b="0" lang="fr-FR" sz="3200" spc="-1" strike="noStrike">
+              <a:solidFill>
+                <a:srgbClr val="000000"/>
+              </a:solidFill>
+              <a:uFill>
+                <a:solidFill>
+                  <a:srgbClr val="ffffff"/>
+                </a:solidFill>
+              </a:uFill>
+              <a:latin typeface="Arial"/>
+            </a:endParaRPr>
+          </a:p>
+        </p:txBody>
+      </p:sp>
+    </p:spTree>
+  </p:cSld>
+</p:sldLayout>
+</file>
+
+<file path=ppt/slideLayouts/slideLayout39.xml><?xml version="1.0" encoding="utf-8"?>
+<p:sldLayout xmlns:a="http://schemas.openxmlformats.org/drawingml/2006/main" xmlns:p="http://schemas.openxmlformats.org/presentationml/2006/main" xmlns:r="http://schemas.openxmlformats.org/officeDocument/2006/relationships" xmlns:p14="http://schemas.microsoft.com/office/powerpoint/2010/main" xmlns:p15="http://schemas.microsoft.com/office/powerpoint/2012/main" xmlns:mc="http://schemas.openxmlformats.org/markup-compatibility/2006" type="obj" preserve="1">
+  <p:cSld name="Title, Content">
+    <p:spTree>
+      <p:nvGrpSpPr>
+        <p:cNvPr id="1" name=""/>
+        <p:cNvGrpSpPr/>
+        <p:nvPr/>
+      </p:nvGrpSpPr>
+      <p:grpSpPr>
+        <a:xfrm>
+          <a:off x="0" y="0"/>
+          <a:ext cx="0" cy="0"/>
+          <a:chOff x="0" y="0"/>
+          <a:chExt cx="0" cy="0"/>
+        </a:xfrm>
+      </p:grpSpPr>
+      <p:sp>
+        <p:nvSpPr>
+          <p:cNvPr id="122" name="PlaceHolder 1"/>
+          <p:cNvSpPr>
+            <a:spLocks noGrp="1"/>
+          </p:cNvSpPr>
+          <p:nvPr>
+            <p:ph type="title"/>
+          </p:nvPr>
+        </p:nvSpPr>
+        <p:spPr>
+          <a:xfrm>
+            <a:off x="504000" y="226080"/>
+            <a:ext cx="9072000" cy="946440"/>
+          </a:xfrm>
+          <a:prstGeom prst="rect">
+            <a:avLst/>
+          </a:prstGeom>
+        </p:spPr>
+        <p:txBody>
+          <a:bodyPr lIns="0" rIns="0" tIns="0" bIns="0" anchor="ctr"/>
+          <a:p>
+            <a:pPr algn="ctr"/>
+            <a:endParaRPr b="0" lang="fr-FR" sz="4400" spc="-1" strike="noStrike">
+              <a:solidFill>
+                <a:srgbClr val="000000"/>
+              </a:solidFill>
+              <a:uFill>
+                <a:solidFill>
+                  <a:srgbClr val="ffffff"/>
+                </a:solidFill>
+              </a:uFill>
+              <a:latin typeface="Arial"/>
+            </a:endParaRPr>
+          </a:p>
+        </p:txBody>
+      </p:sp>
+      <p:sp>
+        <p:nvSpPr>
+          <p:cNvPr id="123" name="PlaceHolder 2"/>
+          <p:cNvSpPr>
+            <a:spLocks noGrp="1"/>
+          </p:cNvSpPr>
+          <p:nvPr>
+            <p:ph type="body"/>
+          </p:nvPr>
+        </p:nvSpPr>
+        <p:spPr>
+          <a:xfrm>
+            <a:off x="504000" y="1326600"/>
+            <a:ext cx="9072000" cy="3288600"/>
+          </a:xfrm>
+          <a:prstGeom prst="rect">
+            <a:avLst/>
+          </a:prstGeom>
+        </p:spPr>
+        <p:txBody>
+          <a:bodyPr lIns="0" rIns="0" tIns="0" bIns="0">
+            <a:normAutofit/>
+          </a:bodyPr>
+          <a:p>
+            <a:endParaRPr b="0" lang="fr-FR" sz="3200" spc="-1" strike="noStrike">
+              <a:solidFill>
+                <a:srgbClr val="000000"/>
+              </a:solidFill>
+              <a:uFill>
+                <a:solidFill>
+                  <a:srgbClr val="ffffff"/>
+                </a:solidFill>
+              </a:uFill>
+              <a:latin typeface="Arial"/>
+            </a:endParaRPr>
+          </a:p>
+        </p:txBody>
+      </p:sp>
+    </p:spTree>
+  </p:cSld>
+</p:sldLayout>
+</file>
+
 <file path=ppt/slideLayouts/slideLayout4.xml><?xml version="1.0" encoding="utf-8"?>
 <p:sldLayout xmlns:a="http://schemas.openxmlformats.org/drawingml/2006/main" xmlns:p="http://schemas.openxmlformats.org/presentationml/2006/main" xmlns:r="http://schemas.openxmlformats.org/officeDocument/2006/relationships" xmlns:p14="http://schemas.microsoft.com/office/powerpoint/2010/main" xmlns:p15="http://schemas.microsoft.com/office/powerpoint/2012/main" xmlns:mc="http://schemas.openxmlformats.org/markup-compatibility/2006" type="twoObj" preserve="1">
   <p:cSld name="Title, 2 Content">
@@ -4219,6 +4435,1411 @@
           <a:xfrm>
             <a:off x="5152680" y="1326600"/>
             <a:ext cx="4426920" cy="3288600"/>
+          </a:xfrm>
+          <a:prstGeom prst="rect">
+            <a:avLst/>
+          </a:prstGeom>
+        </p:spPr>
+        <p:txBody>
+          <a:bodyPr lIns="0" rIns="0" tIns="0" bIns="0">
+            <a:normAutofit/>
+          </a:bodyPr>
+          <a:p>
+            <a:endParaRPr b="0" lang="fr-FR" sz="3200" spc="-1" strike="noStrike">
+              <a:solidFill>
+                <a:srgbClr val="000000"/>
+              </a:solidFill>
+              <a:uFill>
+                <a:solidFill>
+                  <a:srgbClr val="ffffff"/>
+                </a:solidFill>
+              </a:uFill>
+              <a:latin typeface="Arial"/>
+            </a:endParaRPr>
+          </a:p>
+        </p:txBody>
+      </p:sp>
+    </p:spTree>
+  </p:cSld>
+</p:sldLayout>
+</file>
+
+<file path=ppt/slideLayouts/slideLayout40.xml><?xml version="1.0" encoding="utf-8"?>
+<p:sldLayout xmlns:a="http://schemas.openxmlformats.org/drawingml/2006/main" xmlns:p="http://schemas.openxmlformats.org/presentationml/2006/main" xmlns:r="http://schemas.openxmlformats.org/officeDocument/2006/relationships" xmlns:p14="http://schemas.microsoft.com/office/powerpoint/2010/main" xmlns:p15="http://schemas.microsoft.com/office/powerpoint/2012/main" xmlns:mc="http://schemas.openxmlformats.org/markup-compatibility/2006" type="twoObj" preserve="1">
+  <p:cSld name="Title, 2 Content">
+    <p:spTree>
+      <p:nvGrpSpPr>
+        <p:cNvPr id="1" name=""/>
+        <p:cNvGrpSpPr/>
+        <p:nvPr/>
+      </p:nvGrpSpPr>
+      <p:grpSpPr>
+        <a:xfrm>
+          <a:off x="0" y="0"/>
+          <a:ext cx="0" cy="0"/>
+          <a:chOff x="0" y="0"/>
+          <a:chExt cx="0" cy="0"/>
+        </a:xfrm>
+      </p:grpSpPr>
+      <p:sp>
+        <p:nvSpPr>
+          <p:cNvPr id="124" name="PlaceHolder 1"/>
+          <p:cNvSpPr>
+            <a:spLocks noGrp="1"/>
+          </p:cNvSpPr>
+          <p:nvPr>
+            <p:ph type="title"/>
+          </p:nvPr>
+        </p:nvSpPr>
+        <p:spPr>
+          <a:xfrm>
+            <a:off x="504000" y="226080"/>
+            <a:ext cx="9072000" cy="946440"/>
+          </a:xfrm>
+          <a:prstGeom prst="rect">
+            <a:avLst/>
+          </a:prstGeom>
+        </p:spPr>
+        <p:txBody>
+          <a:bodyPr lIns="0" rIns="0" tIns="0" bIns="0" anchor="ctr"/>
+          <a:p>
+            <a:pPr algn="ctr"/>
+            <a:endParaRPr b="0" lang="fr-FR" sz="4400" spc="-1" strike="noStrike">
+              <a:solidFill>
+                <a:srgbClr val="000000"/>
+              </a:solidFill>
+              <a:uFill>
+                <a:solidFill>
+                  <a:srgbClr val="ffffff"/>
+                </a:solidFill>
+              </a:uFill>
+              <a:latin typeface="Arial"/>
+            </a:endParaRPr>
+          </a:p>
+        </p:txBody>
+      </p:sp>
+      <p:sp>
+        <p:nvSpPr>
+          <p:cNvPr id="125" name="PlaceHolder 2"/>
+          <p:cNvSpPr>
+            <a:spLocks noGrp="1"/>
+          </p:cNvSpPr>
+          <p:nvPr>
+            <p:ph type="body"/>
+          </p:nvPr>
+        </p:nvSpPr>
+        <p:spPr>
+          <a:xfrm>
+            <a:off x="504000" y="1326600"/>
+            <a:ext cx="4426920" cy="3288600"/>
+          </a:xfrm>
+          <a:prstGeom prst="rect">
+            <a:avLst/>
+          </a:prstGeom>
+        </p:spPr>
+        <p:txBody>
+          <a:bodyPr lIns="0" rIns="0" tIns="0" bIns="0">
+            <a:normAutofit/>
+          </a:bodyPr>
+          <a:p>
+            <a:endParaRPr b="0" lang="fr-FR" sz="3200" spc="-1" strike="noStrike">
+              <a:solidFill>
+                <a:srgbClr val="000000"/>
+              </a:solidFill>
+              <a:uFill>
+                <a:solidFill>
+                  <a:srgbClr val="ffffff"/>
+                </a:solidFill>
+              </a:uFill>
+              <a:latin typeface="Arial"/>
+            </a:endParaRPr>
+          </a:p>
+        </p:txBody>
+      </p:sp>
+      <p:sp>
+        <p:nvSpPr>
+          <p:cNvPr id="126" name="PlaceHolder 3"/>
+          <p:cNvSpPr>
+            <a:spLocks noGrp="1"/>
+          </p:cNvSpPr>
+          <p:nvPr>
+            <p:ph type="body"/>
+          </p:nvPr>
+        </p:nvSpPr>
+        <p:spPr>
+          <a:xfrm>
+            <a:off x="5152680" y="1326600"/>
+            <a:ext cx="4426920" cy="3288600"/>
+          </a:xfrm>
+          <a:prstGeom prst="rect">
+            <a:avLst/>
+          </a:prstGeom>
+        </p:spPr>
+        <p:txBody>
+          <a:bodyPr lIns="0" rIns="0" tIns="0" bIns="0">
+            <a:normAutofit/>
+          </a:bodyPr>
+          <a:p>
+            <a:endParaRPr b="0" lang="fr-FR" sz="3200" spc="-1" strike="noStrike">
+              <a:solidFill>
+                <a:srgbClr val="000000"/>
+              </a:solidFill>
+              <a:uFill>
+                <a:solidFill>
+                  <a:srgbClr val="ffffff"/>
+                </a:solidFill>
+              </a:uFill>
+              <a:latin typeface="Arial"/>
+            </a:endParaRPr>
+          </a:p>
+        </p:txBody>
+      </p:sp>
+    </p:spTree>
+  </p:cSld>
+</p:sldLayout>
+</file>
+
+<file path=ppt/slideLayouts/slideLayout41.xml><?xml version="1.0" encoding="utf-8"?>
+<p:sldLayout xmlns:a="http://schemas.openxmlformats.org/drawingml/2006/main" xmlns:p="http://schemas.openxmlformats.org/presentationml/2006/main" xmlns:r="http://schemas.openxmlformats.org/officeDocument/2006/relationships" xmlns:p14="http://schemas.microsoft.com/office/powerpoint/2010/main" xmlns:p15="http://schemas.microsoft.com/office/powerpoint/2012/main" xmlns:mc="http://schemas.openxmlformats.org/markup-compatibility/2006" type="titleOnly" preserve="1">
+  <p:cSld name="Title Only">
+    <p:spTree>
+      <p:nvGrpSpPr>
+        <p:cNvPr id="1" name=""/>
+        <p:cNvGrpSpPr/>
+        <p:nvPr/>
+      </p:nvGrpSpPr>
+      <p:grpSpPr>
+        <a:xfrm>
+          <a:off x="0" y="0"/>
+          <a:ext cx="0" cy="0"/>
+          <a:chOff x="0" y="0"/>
+          <a:chExt cx="0" cy="0"/>
+        </a:xfrm>
+      </p:grpSpPr>
+      <p:sp>
+        <p:nvSpPr>
+          <p:cNvPr id="127" name="PlaceHolder 1"/>
+          <p:cNvSpPr>
+            <a:spLocks noGrp="1"/>
+          </p:cNvSpPr>
+          <p:nvPr>
+            <p:ph type="title"/>
+          </p:nvPr>
+        </p:nvSpPr>
+        <p:spPr>
+          <a:xfrm>
+            <a:off x="504000" y="226080"/>
+            <a:ext cx="9072000" cy="946440"/>
+          </a:xfrm>
+          <a:prstGeom prst="rect">
+            <a:avLst/>
+          </a:prstGeom>
+        </p:spPr>
+        <p:txBody>
+          <a:bodyPr lIns="0" rIns="0" tIns="0" bIns="0" anchor="ctr"/>
+          <a:p>
+            <a:pPr algn="ctr"/>
+            <a:endParaRPr b="0" lang="fr-FR" sz="4400" spc="-1" strike="noStrike">
+              <a:solidFill>
+                <a:srgbClr val="000000"/>
+              </a:solidFill>
+              <a:uFill>
+                <a:solidFill>
+                  <a:srgbClr val="ffffff"/>
+                </a:solidFill>
+              </a:uFill>
+              <a:latin typeface="Arial"/>
+            </a:endParaRPr>
+          </a:p>
+        </p:txBody>
+      </p:sp>
+    </p:spTree>
+  </p:cSld>
+</p:sldLayout>
+</file>
+
+<file path=ppt/slideLayouts/slideLayout42.xml><?xml version="1.0" encoding="utf-8"?>
+<p:sldLayout xmlns:a="http://schemas.openxmlformats.org/drawingml/2006/main" xmlns:p="http://schemas.openxmlformats.org/presentationml/2006/main" xmlns:r="http://schemas.openxmlformats.org/officeDocument/2006/relationships" xmlns:p14="http://schemas.microsoft.com/office/powerpoint/2010/main" xmlns:p15="http://schemas.microsoft.com/office/powerpoint/2012/main" xmlns:mc="http://schemas.openxmlformats.org/markup-compatibility/2006" type="objOnly" preserve="1">
+  <p:cSld name="Centered Text">
+    <p:spTree>
+      <p:nvGrpSpPr>
+        <p:cNvPr id="1" name=""/>
+        <p:cNvGrpSpPr/>
+        <p:nvPr/>
+      </p:nvGrpSpPr>
+      <p:grpSpPr>
+        <a:xfrm>
+          <a:off x="0" y="0"/>
+          <a:ext cx="0" cy="0"/>
+          <a:chOff x="0" y="0"/>
+          <a:chExt cx="0" cy="0"/>
+        </a:xfrm>
+      </p:grpSpPr>
+      <p:sp>
+        <p:nvSpPr>
+          <p:cNvPr id="128" name="PlaceHolder 1"/>
+          <p:cNvSpPr>
+            <a:spLocks noGrp="1"/>
+          </p:cNvSpPr>
+          <p:nvPr>
+            <p:ph type="subTitle"/>
+          </p:nvPr>
+        </p:nvSpPr>
+        <p:spPr>
+          <a:xfrm>
+            <a:off x="504000" y="226080"/>
+            <a:ext cx="9072000" cy="4388400"/>
+          </a:xfrm>
+          <a:prstGeom prst="rect">
+            <a:avLst/>
+          </a:prstGeom>
+        </p:spPr>
+        <p:txBody>
+          <a:bodyPr lIns="0" rIns="0" tIns="0" bIns="0" anchor="ctr"/>
+          <a:p>
+            <a:pPr algn="ctr"/>
+            <a:endParaRPr b="0" lang="fr-FR" sz="3200" spc="-1" strike="noStrike">
+              <a:solidFill>
+                <a:srgbClr val="000000"/>
+              </a:solidFill>
+              <a:uFill>
+                <a:solidFill>
+                  <a:srgbClr val="ffffff"/>
+                </a:solidFill>
+              </a:uFill>
+              <a:latin typeface="Arial"/>
+            </a:endParaRPr>
+          </a:p>
+        </p:txBody>
+      </p:sp>
+    </p:spTree>
+  </p:cSld>
+</p:sldLayout>
+</file>
+
+<file path=ppt/slideLayouts/slideLayout43.xml><?xml version="1.0" encoding="utf-8"?>
+<p:sldLayout xmlns:a="http://schemas.openxmlformats.org/drawingml/2006/main" xmlns:p="http://schemas.openxmlformats.org/presentationml/2006/main" xmlns:r="http://schemas.openxmlformats.org/officeDocument/2006/relationships" xmlns:p14="http://schemas.microsoft.com/office/powerpoint/2010/main" xmlns:p15="http://schemas.microsoft.com/office/powerpoint/2012/main" xmlns:mc="http://schemas.openxmlformats.org/markup-compatibility/2006" type="twoObjAndObj" preserve="1">
+  <p:cSld name="Title, 2 Content and Content">
+    <p:spTree>
+      <p:nvGrpSpPr>
+        <p:cNvPr id="1" name=""/>
+        <p:cNvGrpSpPr/>
+        <p:nvPr/>
+      </p:nvGrpSpPr>
+      <p:grpSpPr>
+        <a:xfrm>
+          <a:off x="0" y="0"/>
+          <a:ext cx="0" cy="0"/>
+          <a:chOff x="0" y="0"/>
+          <a:chExt cx="0" cy="0"/>
+        </a:xfrm>
+      </p:grpSpPr>
+      <p:sp>
+        <p:nvSpPr>
+          <p:cNvPr id="129" name="PlaceHolder 1"/>
+          <p:cNvSpPr>
+            <a:spLocks noGrp="1"/>
+          </p:cNvSpPr>
+          <p:nvPr>
+            <p:ph type="title"/>
+          </p:nvPr>
+        </p:nvSpPr>
+        <p:spPr>
+          <a:xfrm>
+            <a:off x="504000" y="226080"/>
+            <a:ext cx="9072000" cy="946440"/>
+          </a:xfrm>
+          <a:prstGeom prst="rect">
+            <a:avLst/>
+          </a:prstGeom>
+        </p:spPr>
+        <p:txBody>
+          <a:bodyPr lIns="0" rIns="0" tIns="0" bIns="0" anchor="ctr"/>
+          <a:p>
+            <a:pPr algn="ctr"/>
+            <a:endParaRPr b="0" lang="fr-FR" sz="4400" spc="-1" strike="noStrike">
+              <a:solidFill>
+                <a:srgbClr val="000000"/>
+              </a:solidFill>
+              <a:uFill>
+                <a:solidFill>
+                  <a:srgbClr val="ffffff"/>
+                </a:solidFill>
+              </a:uFill>
+              <a:latin typeface="Arial"/>
+            </a:endParaRPr>
+          </a:p>
+        </p:txBody>
+      </p:sp>
+      <p:sp>
+        <p:nvSpPr>
+          <p:cNvPr id="130" name="PlaceHolder 2"/>
+          <p:cNvSpPr>
+            <a:spLocks noGrp="1"/>
+          </p:cNvSpPr>
+          <p:nvPr>
+            <p:ph type="body"/>
+          </p:nvPr>
+        </p:nvSpPr>
+        <p:spPr>
+          <a:xfrm>
+            <a:off x="504000" y="1326600"/>
+            <a:ext cx="4426920" cy="1568520"/>
+          </a:xfrm>
+          <a:prstGeom prst="rect">
+            <a:avLst/>
+          </a:prstGeom>
+        </p:spPr>
+        <p:txBody>
+          <a:bodyPr lIns="0" rIns="0" tIns="0" bIns="0">
+            <a:normAutofit/>
+          </a:bodyPr>
+          <a:p>
+            <a:endParaRPr b="0" lang="fr-FR" sz="3200" spc="-1" strike="noStrike">
+              <a:solidFill>
+                <a:srgbClr val="000000"/>
+              </a:solidFill>
+              <a:uFill>
+                <a:solidFill>
+                  <a:srgbClr val="ffffff"/>
+                </a:solidFill>
+              </a:uFill>
+              <a:latin typeface="Arial"/>
+            </a:endParaRPr>
+          </a:p>
+        </p:txBody>
+      </p:sp>
+      <p:sp>
+        <p:nvSpPr>
+          <p:cNvPr id="131" name="PlaceHolder 3"/>
+          <p:cNvSpPr>
+            <a:spLocks noGrp="1"/>
+          </p:cNvSpPr>
+          <p:nvPr>
+            <p:ph type="body"/>
+          </p:nvPr>
+        </p:nvSpPr>
+        <p:spPr>
+          <a:xfrm>
+            <a:off x="504000" y="3044520"/>
+            <a:ext cx="4426920" cy="1568520"/>
+          </a:xfrm>
+          <a:prstGeom prst="rect">
+            <a:avLst/>
+          </a:prstGeom>
+        </p:spPr>
+        <p:txBody>
+          <a:bodyPr lIns="0" rIns="0" tIns="0" bIns="0">
+            <a:normAutofit/>
+          </a:bodyPr>
+          <a:p>
+            <a:endParaRPr b="0" lang="fr-FR" sz="3200" spc="-1" strike="noStrike">
+              <a:solidFill>
+                <a:srgbClr val="000000"/>
+              </a:solidFill>
+              <a:uFill>
+                <a:solidFill>
+                  <a:srgbClr val="ffffff"/>
+                </a:solidFill>
+              </a:uFill>
+              <a:latin typeface="Arial"/>
+            </a:endParaRPr>
+          </a:p>
+        </p:txBody>
+      </p:sp>
+      <p:sp>
+        <p:nvSpPr>
+          <p:cNvPr id="132" name="PlaceHolder 4"/>
+          <p:cNvSpPr>
+            <a:spLocks noGrp="1"/>
+          </p:cNvSpPr>
+          <p:nvPr>
+            <p:ph type="body"/>
+          </p:nvPr>
+        </p:nvSpPr>
+        <p:spPr>
+          <a:xfrm>
+            <a:off x="5152680" y="1326600"/>
+            <a:ext cx="4426920" cy="3288600"/>
+          </a:xfrm>
+          <a:prstGeom prst="rect">
+            <a:avLst/>
+          </a:prstGeom>
+        </p:spPr>
+        <p:txBody>
+          <a:bodyPr lIns="0" rIns="0" tIns="0" bIns="0">
+            <a:normAutofit/>
+          </a:bodyPr>
+          <a:p>
+            <a:endParaRPr b="0" lang="fr-FR" sz="3200" spc="-1" strike="noStrike">
+              <a:solidFill>
+                <a:srgbClr val="000000"/>
+              </a:solidFill>
+              <a:uFill>
+                <a:solidFill>
+                  <a:srgbClr val="ffffff"/>
+                </a:solidFill>
+              </a:uFill>
+              <a:latin typeface="Arial"/>
+            </a:endParaRPr>
+          </a:p>
+        </p:txBody>
+      </p:sp>
+    </p:spTree>
+  </p:cSld>
+</p:sldLayout>
+</file>
+
+<file path=ppt/slideLayouts/slideLayout44.xml><?xml version="1.0" encoding="utf-8"?>
+<p:sldLayout xmlns:a="http://schemas.openxmlformats.org/drawingml/2006/main" xmlns:p="http://schemas.openxmlformats.org/presentationml/2006/main" xmlns:r="http://schemas.openxmlformats.org/officeDocument/2006/relationships" xmlns:p14="http://schemas.microsoft.com/office/powerpoint/2010/main" xmlns:p15="http://schemas.microsoft.com/office/powerpoint/2012/main" xmlns:mc="http://schemas.openxmlformats.org/markup-compatibility/2006" type="objAndTwoObj" preserve="1">
+  <p:cSld name="Title Content and 2 Content">
+    <p:spTree>
+      <p:nvGrpSpPr>
+        <p:cNvPr id="1" name=""/>
+        <p:cNvGrpSpPr/>
+        <p:nvPr/>
+      </p:nvGrpSpPr>
+      <p:grpSpPr>
+        <a:xfrm>
+          <a:off x="0" y="0"/>
+          <a:ext cx="0" cy="0"/>
+          <a:chOff x="0" y="0"/>
+          <a:chExt cx="0" cy="0"/>
+        </a:xfrm>
+      </p:grpSpPr>
+      <p:sp>
+        <p:nvSpPr>
+          <p:cNvPr id="133" name="PlaceHolder 1"/>
+          <p:cNvSpPr>
+            <a:spLocks noGrp="1"/>
+          </p:cNvSpPr>
+          <p:nvPr>
+            <p:ph type="title"/>
+          </p:nvPr>
+        </p:nvSpPr>
+        <p:spPr>
+          <a:xfrm>
+            <a:off x="504000" y="226080"/>
+            <a:ext cx="9072000" cy="946440"/>
+          </a:xfrm>
+          <a:prstGeom prst="rect">
+            <a:avLst/>
+          </a:prstGeom>
+        </p:spPr>
+        <p:txBody>
+          <a:bodyPr lIns="0" rIns="0" tIns="0" bIns="0" anchor="ctr"/>
+          <a:p>
+            <a:pPr algn="ctr"/>
+            <a:endParaRPr b="0" lang="fr-FR" sz="4400" spc="-1" strike="noStrike">
+              <a:solidFill>
+                <a:srgbClr val="000000"/>
+              </a:solidFill>
+              <a:uFill>
+                <a:solidFill>
+                  <a:srgbClr val="ffffff"/>
+                </a:solidFill>
+              </a:uFill>
+              <a:latin typeface="Arial"/>
+            </a:endParaRPr>
+          </a:p>
+        </p:txBody>
+      </p:sp>
+      <p:sp>
+        <p:nvSpPr>
+          <p:cNvPr id="134" name="PlaceHolder 2"/>
+          <p:cNvSpPr>
+            <a:spLocks noGrp="1"/>
+          </p:cNvSpPr>
+          <p:nvPr>
+            <p:ph type="body"/>
+          </p:nvPr>
+        </p:nvSpPr>
+        <p:spPr>
+          <a:xfrm>
+            <a:off x="504000" y="1326600"/>
+            <a:ext cx="4426920" cy="3288600"/>
+          </a:xfrm>
+          <a:prstGeom prst="rect">
+            <a:avLst/>
+          </a:prstGeom>
+        </p:spPr>
+        <p:txBody>
+          <a:bodyPr lIns="0" rIns="0" tIns="0" bIns="0">
+            <a:normAutofit/>
+          </a:bodyPr>
+          <a:p>
+            <a:endParaRPr b="0" lang="fr-FR" sz="3200" spc="-1" strike="noStrike">
+              <a:solidFill>
+                <a:srgbClr val="000000"/>
+              </a:solidFill>
+              <a:uFill>
+                <a:solidFill>
+                  <a:srgbClr val="ffffff"/>
+                </a:solidFill>
+              </a:uFill>
+              <a:latin typeface="Arial"/>
+            </a:endParaRPr>
+          </a:p>
+        </p:txBody>
+      </p:sp>
+      <p:sp>
+        <p:nvSpPr>
+          <p:cNvPr id="135" name="PlaceHolder 3"/>
+          <p:cNvSpPr>
+            <a:spLocks noGrp="1"/>
+          </p:cNvSpPr>
+          <p:nvPr>
+            <p:ph type="body"/>
+          </p:nvPr>
+        </p:nvSpPr>
+        <p:spPr>
+          <a:xfrm>
+            <a:off x="5152680" y="1326600"/>
+            <a:ext cx="4426920" cy="1568520"/>
+          </a:xfrm>
+          <a:prstGeom prst="rect">
+            <a:avLst/>
+          </a:prstGeom>
+        </p:spPr>
+        <p:txBody>
+          <a:bodyPr lIns="0" rIns="0" tIns="0" bIns="0">
+            <a:normAutofit/>
+          </a:bodyPr>
+          <a:p>
+            <a:endParaRPr b="0" lang="fr-FR" sz="3200" spc="-1" strike="noStrike">
+              <a:solidFill>
+                <a:srgbClr val="000000"/>
+              </a:solidFill>
+              <a:uFill>
+                <a:solidFill>
+                  <a:srgbClr val="ffffff"/>
+                </a:solidFill>
+              </a:uFill>
+              <a:latin typeface="Arial"/>
+            </a:endParaRPr>
+          </a:p>
+        </p:txBody>
+      </p:sp>
+      <p:sp>
+        <p:nvSpPr>
+          <p:cNvPr id="136" name="PlaceHolder 4"/>
+          <p:cNvSpPr>
+            <a:spLocks noGrp="1"/>
+          </p:cNvSpPr>
+          <p:nvPr>
+            <p:ph type="body"/>
+          </p:nvPr>
+        </p:nvSpPr>
+        <p:spPr>
+          <a:xfrm>
+            <a:off x="5152680" y="3044520"/>
+            <a:ext cx="4426920" cy="1568520"/>
+          </a:xfrm>
+          <a:prstGeom prst="rect">
+            <a:avLst/>
+          </a:prstGeom>
+        </p:spPr>
+        <p:txBody>
+          <a:bodyPr lIns="0" rIns="0" tIns="0" bIns="0">
+            <a:normAutofit/>
+          </a:bodyPr>
+          <a:p>
+            <a:endParaRPr b="0" lang="fr-FR" sz="3200" spc="-1" strike="noStrike">
+              <a:solidFill>
+                <a:srgbClr val="000000"/>
+              </a:solidFill>
+              <a:uFill>
+                <a:solidFill>
+                  <a:srgbClr val="ffffff"/>
+                </a:solidFill>
+              </a:uFill>
+              <a:latin typeface="Arial"/>
+            </a:endParaRPr>
+          </a:p>
+        </p:txBody>
+      </p:sp>
+    </p:spTree>
+  </p:cSld>
+</p:sldLayout>
+</file>
+
+<file path=ppt/slideLayouts/slideLayout45.xml><?xml version="1.0" encoding="utf-8"?>
+<p:sldLayout xmlns:a="http://schemas.openxmlformats.org/drawingml/2006/main" xmlns:p="http://schemas.openxmlformats.org/presentationml/2006/main" xmlns:r="http://schemas.openxmlformats.org/officeDocument/2006/relationships" xmlns:p14="http://schemas.microsoft.com/office/powerpoint/2010/main" xmlns:p15="http://schemas.microsoft.com/office/powerpoint/2012/main" xmlns:mc="http://schemas.openxmlformats.org/markup-compatibility/2006" type="twoObjOverTx" preserve="1">
+  <p:cSld name="Title, 2 Content over Content">
+    <p:spTree>
+      <p:nvGrpSpPr>
+        <p:cNvPr id="1" name=""/>
+        <p:cNvGrpSpPr/>
+        <p:nvPr/>
+      </p:nvGrpSpPr>
+      <p:grpSpPr>
+        <a:xfrm>
+          <a:off x="0" y="0"/>
+          <a:ext cx="0" cy="0"/>
+          <a:chOff x="0" y="0"/>
+          <a:chExt cx="0" cy="0"/>
+        </a:xfrm>
+      </p:grpSpPr>
+      <p:sp>
+        <p:nvSpPr>
+          <p:cNvPr id="137" name="PlaceHolder 1"/>
+          <p:cNvSpPr>
+            <a:spLocks noGrp="1"/>
+          </p:cNvSpPr>
+          <p:nvPr>
+            <p:ph type="title"/>
+          </p:nvPr>
+        </p:nvSpPr>
+        <p:spPr>
+          <a:xfrm>
+            <a:off x="504000" y="226080"/>
+            <a:ext cx="9072000" cy="946440"/>
+          </a:xfrm>
+          <a:prstGeom prst="rect">
+            <a:avLst/>
+          </a:prstGeom>
+        </p:spPr>
+        <p:txBody>
+          <a:bodyPr lIns="0" rIns="0" tIns="0" bIns="0" anchor="ctr"/>
+          <a:p>
+            <a:pPr algn="ctr"/>
+            <a:endParaRPr b="0" lang="fr-FR" sz="4400" spc="-1" strike="noStrike">
+              <a:solidFill>
+                <a:srgbClr val="000000"/>
+              </a:solidFill>
+              <a:uFill>
+                <a:solidFill>
+                  <a:srgbClr val="ffffff"/>
+                </a:solidFill>
+              </a:uFill>
+              <a:latin typeface="Arial"/>
+            </a:endParaRPr>
+          </a:p>
+        </p:txBody>
+      </p:sp>
+      <p:sp>
+        <p:nvSpPr>
+          <p:cNvPr id="138" name="PlaceHolder 2"/>
+          <p:cNvSpPr>
+            <a:spLocks noGrp="1"/>
+          </p:cNvSpPr>
+          <p:nvPr>
+            <p:ph type="body"/>
+          </p:nvPr>
+        </p:nvSpPr>
+        <p:spPr>
+          <a:xfrm>
+            <a:off x="504000" y="1326600"/>
+            <a:ext cx="4426920" cy="1568520"/>
+          </a:xfrm>
+          <a:prstGeom prst="rect">
+            <a:avLst/>
+          </a:prstGeom>
+        </p:spPr>
+        <p:txBody>
+          <a:bodyPr lIns="0" rIns="0" tIns="0" bIns="0">
+            <a:normAutofit/>
+          </a:bodyPr>
+          <a:p>
+            <a:endParaRPr b="0" lang="fr-FR" sz="3200" spc="-1" strike="noStrike">
+              <a:solidFill>
+                <a:srgbClr val="000000"/>
+              </a:solidFill>
+              <a:uFill>
+                <a:solidFill>
+                  <a:srgbClr val="ffffff"/>
+                </a:solidFill>
+              </a:uFill>
+              <a:latin typeface="Arial"/>
+            </a:endParaRPr>
+          </a:p>
+        </p:txBody>
+      </p:sp>
+      <p:sp>
+        <p:nvSpPr>
+          <p:cNvPr id="139" name="PlaceHolder 3"/>
+          <p:cNvSpPr>
+            <a:spLocks noGrp="1"/>
+          </p:cNvSpPr>
+          <p:nvPr>
+            <p:ph type="body"/>
+          </p:nvPr>
+        </p:nvSpPr>
+        <p:spPr>
+          <a:xfrm>
+            <a:off x="5152680" y="1326600"/>
+            <a:ext cx="4426920" cy="1568520"/>
+          </a:xfrm>
+          <a:prstGeom prst="rect">
+            <a:avLst/>
+          </a:prstGeom>
+        </p:spPr>
+        <p:txBody>
+          <a:bodyPr lIns="0" rIns="0" tIns="0" bIns="0">
+            <a:normAutofit/>
+          </a:bodyPr>
+          <a:p>
+            <a:endParaRPr b="0" lang="fr-FR" sz="3200" spc="-1" strike="noStrike">
+              <a:solidFill>
+                <a:srgbClr val="000000"/>
+              </a:solidFill>
+              <a:uFill>
+                <a:solidFill>
+                  <a:srgbClr val="ffffff"/>
+                </a:solidFill>
+              </a:uFill>
+              <a:latin typeface="Arial"/>
+            </a:endParaRPr>
+          </a:p>
+        </p:txBody>
+      </p:sp>
+      <p:sp>
+        <p:nvSpPr>
+          <p:cNvPr id="140" name="PlaceHolder 4"/>
+          <p:cNvSpPr>
+            <a:spLocks noGrp="1"/>
+          </p:cNvSpPr>
+          <p:nvPr>
+            <p:ph type="body"/>
+          </p:nvPr>
+        </p:nvSpPr>
+        <p:spPr>
+          <a:xfrm>
+            <a:off x="504000" y="3044520"/>
+            <a:ext cx="9072000" cy="1568520"/>
+          </a:xfrm>
+          <a:prstGeom prst="rect">
+            <a:avLst/>
+          </a:prstGeom>
+        </p:spPr>
+        <p:txBody>
+          <a:bodyPr lIns="0" rIns="0" tIns="0" bIns="0">
+            <a:normAutofit/>
+          </a:bodyPr>
+          <a:p>
+            <a:endParaRPr b="0" lang="fr-FR" sz="3200" spc="-1" strike="noStrike">
+              <a:solidFill>
+                <a:srgbClr val="000000"/>
+              </a:solidFill>
+              <a:uFill>
+                <a:solidFill>
+                  <a:srgbClr val="ffffff"/>
+                </a:solidFill>
+              </a:uFill>
+              <a:latin typeface="Arial"/>
+            </a:endParaRPr>
+          </a:p>
+        </p:txBody>
+      </p:sp>
+    </p:spTree>
+  </p:cSld>
+</p:sldLayout>
+</file>
+
+<file path=ppt/slideLayouts/slideLayout46.xml><?xml version="1.0" encoding="utf-8"?>
+<p:sldLayout xmlns:a="http://schemas.openxmlformats.org/drawingml/2006/main" xmlns:p="http://schemas.openxmlformats.org/presentationml/2006/main" xmlns:r="http://schemas.openxmlformats.org/officeDocument/2006/relationships" xmlns:p14="http://schemas.microsoft.com/office/powerpoint/2010/main" xmlns:p15="http://schemas.microsoft.com/office/powerpoint/2012/main" xmlns:mc="http://schemas.openxmlformats.org/markup-compatibility/2006" type="objOverTx" preserve="1">
+  <p:cSld name="Title, Content over Content">
+    <p:spTree>
+      <p:nvGrpSpPr>
+        <p:cNvPr id="1" name=""/>
+        <p:cNvGrpSpPr/>
+        <p:nvPr/>
+      </p:nvGrpSpPr>
+      <p:grpSpPr>
+        <a:xfrm>
+          <a:off x="0" y="0"/>
+          <a:ext cx="0" cy="0"/>
+          <a:chOff x="0" y="0"/>
+          <a:chExt cx="0" cy="0"/>
+        </a:xfrm>
+      </p:grpSpPr>
+      <p:sp>
+        <p:nvSpPr>
+          <p:cNvPr id="141" name="PlaceHolder 1"/>
+          <p:cNvSpPr>
+            <a:spLocks noGrp="1"/>
+          </p:cNvSpPr>
+          <p:nvPr>
+            <p:ph type="title"/>
+          </p:nvPr>
+        </p:nvSpPr>
+        <p:spPr>
+          <a:xfrm>
+            <a:off x="504000" y="226080"/>
+            <a:ext cx="9072000" cy="946440"/>
+          </a:xfrm>
+          <a:prstGeom prst="rect">
+            <a:avLst/>
+          </a:prstGeom>
+        </p:spPr>
+        <p:txBody>
+          <a:bodyPr lIns="0" rIns="0" tIns="0" bIns="0" anchor="ctr"/>
+          <a:p>
+            <a:pPr algn="ctr"/>
+            <a:endParaRPr b="0" lang="fr-FR" sz="4400" spc="-1" strike="noStrike">
+              <a:solidFill>
+                <a:srgbClr val="000000"/>
+              </a:solidFill>
+              <a:uFill>
+                <a:solidFill>
+                  <a:srgbClr val="ffffff"/>
+                </a:solidFill>
+              </a:uFill>
+              <a:latin typeface="Arial"/>
+            </a:endParaRPr>
+          </a:p>
+        </p:txBody>
+      </p:sp>
+      <p:sp>
+        <p:nvSpPr>
+          <p:cNvPr id="142" name="PlaceHolder 2"/>
+          <p:cNvSpPr>
+            <a:spLocks noGrp="1"/>
+          </p:cNvSpPr>
+          <p:nvPr>
+            <p:ph type="body"/>
+          </p:nvPr>
+        </p:nvSpPr>
+        <p:spPr>
+          <a:xfrm>
+            <a:off x="504000" y="1326600"/>
+            <a:ext cx="9072000" cy="1568520"/>
+          </a:xfrm>
+          <a:prstGeom prst="rect">
+            <a:avLst/>
+          </a:prstGeom>
+        </p:spPr>
+        <p:txBody>
+          <a:bodyPr lIns="0" rIns="0" tIns="0" bIns="0">
+            <a:normAutofit/>
+          </a:bodyPr>
+          <a:p>
+            <a:endParaRPr b="0" lang="fr-FR" sz="3200" spc="-1" strike="noStrike">
+              <a:solidFill>
+                <a:srgbClr val="000000"/>
+              </a:solidFill>
+              <a:uFill>
+                <a:solidFill>
+                  <a:srgbClr val="ffffff"/>
+                </a:solidFill>
+              </a:uFill>
+              <a:latin typeface="Arial"/>
+            </a:endParaRPr>
+          </a:p>
+        </p:txBody>
+      </p:sp>
+      <p:sp>
+        <p:nvSpPr>
+          <p:cNvPr id="143" name="PlaceHolder 3"/>
+          <p:cNvSpPr>
+            <a:spLocks noGrp="1"/>
+          </p:cNvSpPr>
+          <p:nvPr>
+            <p:ph type="body"/>
+          </p:nvPr>
+        </p:nvSpPr>
+        <p:spPr>
+          <a:xfrm>
+            <a:off x="504000" y="3044520"/>
+            <a:ext cx="9072000" cy="1568520"/>
+          </a:xfrm>
+          <a:prstGeom prst="rect">
+            <a:avLst/>
+          </a:prstGeom>
+        </p:spPr>
+        <p:txBody>
+          <a:bodyPr lIns="0" rIns="0" tIns="0" bIns="0">
+            <a:normAutofit/>
+          </a:bodyPr>
+          <a:p>
+            <a:endParaRPr b="0" lang="fr-FR" sz="3200" spc="-1" strike="noStrike">
+              <a:solidFill>
+                <a:srgbClr val="000000"/>
+              </a:solidFill>
+              <a:uFill>
+                <a:solidFill>
+                  <a:srgbClr val="ffffff"/>
+                </a:solidFill>
+              </a:uFill>
+              <a:latin typeface="Arial"/>
+            </a:endParaRPr>
+          </a:p>
+        </p:txBody>
+      </p:sp>
+    </p:spTree>
+  </p:cSld>
+</p:sldLayout>
+</file>
+
+<file path=ppt/slideLayouts/slideLayout47.xml><?xml version="1.0" encoding="utf-8"?>
+<p:sldLayout xmlns:a="http://schemas.openxmlformats.org/drawingml/2006/main" xmlns:p="http://schemas.openxmlformats.org/presentationml/2006/main" xmlns:r="http://schemas.openxmlformats.org/officeDocument/2006/relationships" xmlns:p14="http://schemas.microsoft.com/office/powerpoint/2010/main" xmlns:p15="http://schemas.microsoft.com/office/powerpoint/2012/main" xmlns:mc="http://schemas.openxmlformats.org/markup-compatibility/2006" type="fourObj" preserve="1">
+  <p:cSld name="Title, 4 Content">
+    <p:spTree>
+      <p:nvGrpSpPr>
+        <p:cNvPr id="1" name=""/>
+        <p:cNvGrpSpPr/>
+        <p:nvPr/>
+      </p:nvGrpSpPr>
+      <p:grpSpPr>
+        <a:xfrm>
+          <a:off x="0" y="0"/>
+          <a:ext cx="0" cy="0"/>
+          <a:chOff x="0" y="0"/>
+          <a:chExt cx="0" cy="0"/>
+        </a:xfrm>
+      </p:grpSpPr>
+      <p:sp>
+        <p:nvSpPr>
+          <p:cNvPr id="144" name="PlaceHolder 1"/>
+          <p:cNvSpPr>
+            <a:spLocks noGrp="1"/>
+          </p:cNvSpPr>
+          <p:nvPr>
+            <p:ph type="title"/>
+          </p:nvPr>
+        </p:nvSpPr>
+        <p:spPr>
+          <a:xfrm>
+            <a:off x="504000" y="226080"/>
+            <a:ext cx="9072000" cy="946440"/>
+          </a:xfrm>
+          <a:prstGeom prst="rect">
+            <a:avLst/>
+          </a:prstGeom>
+        </p:spPr>
+        <p:txBody>
+          <a:bodyPr lIns="0" rIns="0" tIns="0" bIns="0" anchor="ctr"/>
+          <a:p>
+            <a:pPr algn="ctr"/>
+            <a:endParaRPr b="0" lang="fr-FR" sz="4400" spc="-1" strike="noStrike">
+              <a:solidFill>
+                <a:srgbClr val="000000"/>
+              </a:solidFill>
+              <a:uFill>
+                <a:solidFill>
+                  <a:srgbClr val="ffffff"/>
+                </a:solidFill>
+              </a:uFill>
+              <a:latin typeface="Arial"/>
+            </a:endParaRPr>
+          </a:p>
+        </p:txBody>
+      </p:sp>
+      <p:sp>
+        <p:nvSpPr>
+          <p:cNvPr id="145" name="PlaceHolder 2"/>
+          <p:cNvSpPr>
+            <a:spLocks noGrp="1"/>
+          </p:cNvSpPr>
+          <p:nvPr>
+            <p:ph type="body"/>
+          </p:nvPr>
+        </p:nvSpPr>
+        <p:spPr>
+          <a:xfrm>
+            <a:off x="504000" y="1326600"/>
+            <a:ext cx="4426920" cy="1568520"/>
+          </a:xfrm>
+          <a:prstGeom prst="rect">
+            <a:avLst/>
+          </a:prstGeom>
+        </p:spPr>
+        <p:txBody>
+          <a:bodyPr lIns="0" rIns="0" tIns="0" bIns="0">
+            <a:normAutofit/>
+          </a:bodyPr>
+          <a:p>
+            <a:endParaRPr b="0" lang="fr-FR" sz="3200" spc="-1" strike="noStrike">
+              <a:solidFill>
+                <a:srgbClr val="000000"/>
+              </a:solidFill>
+              <a:uFill>
+                <a:solidFill>
+                  <a:srgbClr val="ffffff"/>
+                </a:solidFill>
+              </a:uFill>
+              <a:latin typeface="Arial"/>
+            </a:endParaRPr>
+          </a:p>
+        </p:txBody>
+      </p:sp>
+      <p:sp>
+        <p:nvSpPr>
+          <p:cNvPr id="146" name="PlaceHolder 3"/>
+          <p:cNvSpPr>
+            <a:spLocks noGrp="1"/>
+          </p:cNvSpPr>
+          <p:nvPr>
+            <p:ph type="body"/>
+          </p:nvPr>
+        </p:nvSpPr>
+        <p:spPr>
+          <a:xfrm>
+            <a:off x="5152680" y="1326600"/>
+            <a:ext cx="4426920" cy="1568520"/>
+          </a:xfrm>
+          <a:prstGeom prst="rect">
+            <a:avLst/>
+          </a:prstGeom>
+        </p:spPr>
+        <p:txBody>
+          <a:bodyPr lIns="0" rIns="0" tIns="0" bIns="0">
+            <a:normAutofit/>
+          </a:bodyPr>
+          <a:p>
+            <a:endParaRPr b="0" lang="fr-FR" sz="3200" spc="-1" strike="noStrike">
+              <a:solidFill>
+                <a:srgbClr val="000000"/>
+              </a:solidFill>
+              <a:uFill>
+                <a:solidFill>
+                  <a:srgbClr val="ffffff"/>
+                </a:solidFill>
+              </a:uFill>
+              <a:latin typeface="Arial"/>
+            </a:endParaRPr>
+          </a:p>
+        </p:txBody>
+      </p:sp>
+      <p:sp>
+        <p:nvSpPr>
+          <p:cNvPr id="147" name="PlaceHolder 4"/>
+          <p:cNvSpPr>
+            <a:spLocks noGrp="1"/>
+          </p:cNvSpPr>
+          <p:nvPr>
+            <p:ph type="body"/>
+          </p:nvPr>
+        </p:nvSpPr>
+        <p:spPr>
+          <a:xfrm>
+            <a:off x="5152680" y="3044520"/>
+            <a:ext cx="4426920" cy="1568520"/>
+          </a:xfrm>
+          <a:prstGeom prst="rect">
+            <a:avLst/>
+          </a:prstGeom>
+        </p:spPr>
+        <p:txBody>
+          <a:bodyPr lIns="0" rIns="0" tIns="0" bIns="0">
+            <a:normAutofit/>
+          </a:bodyPr>
+          <a:p>
+            <a:endParaRPr b="0" lang="fr-FR" sz="3200" spc="-1" strike="noStrike">
+              <a:solidFill>
+                <a:srgbClr val="000000"/>
+              </a:solidFill>
+              <a:uFill>
+                <a:solidFill>
+                  <a:srgbClr val="ffffff"/>
+                </a:solidFill>
+              </a:uFill>
+              <a:latin typeface="Arial"/>
+            </a:endParaRPr>
+          </a:p>
+        </p:txBody>
+      </p:sp>
+      <p:sp>
+        <p:nvSpPr>
+          <p:cNvPr id="148" name="PlaceHolder 5"/>
+          <p:cNvSpPr>
+            <a:spLocks noGrp="1"/>
+          </p:cNvSpPr>
+          <p:nvPr>
+            <p:ph type="body"/>
+          </p:nvPr>
+        </p:nvSpPr>
+        <p:spPr>
+          <a:xfrm>
+            <a:off x="504000" y="3044520"/>
+            <a:ext cx="4426920" cy="1568520"/>
+          </a:xfrm>
+          <a:prstGeom prst="rect">
+            <a:avLst/>
+          </a:prstGeom>
+        </p:spPr>
+        <p:txBody>
+          <a:bodyPr lIns="0" rIns="0" tIns="0" bIns="0">
+            <a:normAutofit/>
+          </a:bodyPr>
+          <a:p>
+            <a:endParaRPr b="0" lang="fr-FR" sz="3200" spc="-1" strike="noStrike">
+              <a:solidFill>
+                <a:srgbClr val="000000"/>
+              </a:solidFill>
+              <a:uFill>
+                <a:solidFill>
+                  <a:srgbClr val="ffffff"/>
+                </a:solidFill>
+              </a:uFill>
+              <a:latin typeface="Arial"/>
+            </a:endParaRPr>
+          </a:p>
+        </p:txBody>
+      </p:sp>
+    </p:spTree>
+  </p:cSld>
+</p:sldLayout>
+</file>
+
+<file path=ppt/slideLayouts/slideLayout48.xml><?xml version="1.0" encoding="utf-8"?>
+<p:sldLayout xmlns:a="http://schemas.openxmlformats.org/drawingml/2006/main" xmlns:p="http://schemas.openxmlformats.org/presentationml/2006/main" xmlns:r="http://schemas.openxmlformats.org/officeDocument/2006/relationships" xmlns:p14="http://schemas.microsoft.com/office/powerpoint/2010/main" xmlns:p15="http://schemas.microsoft.com/office/powerpoint/2012/main" xmlns:mc="http://schemas.openxmlformats.org/markup-compatibility/2006" type="blank" preserve="1">
+  <p:cSld name="Title, 6 Content">
+    <p:spTree>
+      <p:nvGrpSpPr>
+        <p:cNvPr id="1" name=""/>
+        <p:cNvGrpSpPr/>
+        <p:nvPr/>
+      </p:nvGrpSpPr>
+      <p:grpSpPr>
+        <a:xfrm>
+          <a:off x="0" y="0"/>
+          <a:ext cx="0" cy="0"/>
+          <a:chOff x="0" y="0"/>
+          <a:chExt cx="0" cy="0"/>
+        </a:xfrm>
+      </p:grpSpPr>
+      <p:sp>
+        <p:nvSpPr>
+          <p:cNvPr id="149" name="PlaceHolder 1"/>
+          <p:cNvSpPr>
+            <a:spLocks noGrp="1"/>
+          </p:cNvSpPr>
+          <p:nvPr>
+            <p:ph type="title"/>
+          </p:nvPr>
+        </p:nvSpPr>
+        <p:spPr>
+          <a:xfrm>
+            <a:off x="504000" y="226080"/>
+            <a:ext cx="9072000" cy="946440"/>
+          </a:xfrm>
+          <a:prstGeom prst="rect">
+            <a:avLst/>
+          </a:prstGeom>
+        </p:spPr>
+        <p:txBody>
+          <a:bodyPr lIns="0" rIns="0" tIns="0" bIns="0" anchor="ctr"/>
+          <a:p>
+            <a:pPr algn="ctr"/>
+            <a:endParaRPr b="0" lang="fr-FR" sz="4400" spc="-1" strike="noStrike">
+              <a:solidFill>
+                <a:srgbClr val="000000"/>
+              </a:solidFill>
+              <a:uFill>
+                <a:solidFill>
+                  <a:srgbClr val="ffffff"/>
+                </a:solidFill>
+              </a:uFill>
+              <a:latin typeface="Arial"/>
+            </a:endParaRPr>
+          </a:p>
+        </p:txBody>
+      </p:sp>
+      <p:sp>
+        <p:nvSpPr>
+          <p:cNvPr id="150" name="PlaceHolder 2"/>
+          <p:cNvSpPr>
+            <a:spLocks noGrp="1"/>
+          </p:cNvSpPr>
+          <p:nvPr>
+            <p:ph type="body"/>
+          </p:nvPr>
+        </p:nvSpPr>
+        <p:spPr>
+          <a:xfrm>
+            <a:off x="504000" y="1326600"/>
+            <a:ext cx="2921040" cy="1568520"/>
+          </a:xfrm>
+          <a:prstGeom prst="rect">
+            <a:avLst/>
+          </a:prstGeom>
+        </p:spPr>
+        <p:txBody>
+          <a:bodyPr lIns="0" rIns="0" tIns="0" bIns="0">
+            <a:normAutofit/>
+          </a:bodyPr>
+          <a:p>
+            <a:endParaRPr b="0" lang="fr-FR" sz="3200" spc="-1" strike="noStrike">
+              <a:solidFill>
+                <a:srgbClr val="000000"/>
+              </a:solidFill>
+              <a:uFill>
+                <a:solidFill>
+                  <a:srgbClr val="ffffff"/>
+                </a:solidFill>
+              </a:uFill>
+              <a:latin typeface="Arial"/>
+            </a:endParaRPr>
+          </a:p>
+        </p:txBody>
+      </p:sp>
+      <p:sp>
+        <p:nvSpPr>
+          <p:cNvPr id="151" name="PlaceHolder 3"/>
+          <p:cNvSpPr>
+            <a:spLocks noGrp="1"/>
+          </p:cNvSpPr>
+          <p:nvPr>
+            <p:ph type="body"/>
+          </p:nvPr>
+        </p:nvSpPr>
+        <p:spPr>
+          <a:xfrm>
+            <a:off x="3571560" y="1326600"/>
+            <a:ext cx="2921040" cy="1568520"/>
+          </a:xfrm>
+          <a:prstGeom prst="rect">
+            <a:avLst/>
+          </a:prstGeom>
+        </p:spPr>
+        <p:txBody>
+          <a:bodyPr lIns="0" rIns="0" tIns="0" bIns="0">
+            <a:normAutofit/>
+          </a:bodyPr>
+          <a:p>
+            <a:endParaRPr b="0" lang="fr-FR" sz="3200" spc="-1" strike="noStrike">
+              <a:solidFill>
+                <a:srgbClr val="000000"/>
+              </a:solidFill>
+              <a:uFill>
+                <a:solidFill>
+                  <a:srgbClr val="ffffff"/>
+                </a:solidFill>
+              </a:uFill>
+              <a:latin typeface="Arial"/>
+            </a:endParaRPr>
+          </a:p>
+        </p:txBody>
+      </p:sp>
+      <p:sp>
+        <p:nvSpPr>
+          <p:cNvPr id="152" name="PlaceHolder 4"/>
+          <p:cNvSpPr>
+            <a:spLocks noGrp="1"/>
+          </p:cNvSpPr>
+          <p:nvPr>
+            <p:ph type="body"/>
+          </p:nvPr>
+        </p:nvSpPr>
+        <p:spPr>
+          <a:xfrm>
+            <a:off x="6639120" y="1326600"/>
+            <a:ext cx="2921040" cy="1568520"/>
+          </a:xfrm>
+          <a:prstGeom prst="rect">
+            <a:avLst/>
+          </a:prstGeom>
+        </p:spPr>
+        <p:txBody>
+          <a:bodyPr lIns="0" rIns="0" tIns="0" bIns="0">
+            <a:normAutofit/>
+          </a:bodyPr>
+          <a:p>
+            <a:endParaRPr b="0" lang="fr-FR" sz="3200" spc="-1" strike="noStrike">
+              <a:solidFill>
+                <a:srgbClr val="000000"/>
+              </a:solidFill>
+              <a:uFill>
+                <a:solidFill>
+                  <a:srgbClr val="ffffff"/>
+                </a:solidFill>
+              </a:uFill>
+              <a:latin typeface="Arial"/>
+            </a:endParaRPr>
+          </a:p>
+        </p:txBody>
+      </p:sp>
+      <p:sp>
+        <p:nvSpPr>
+          <p:cNvPr id="153" name="PlaceHolder 5"/>
+          <p:cNvSpPr>
+            <a:spLocks noGrp="1"/>
+          </p:cNvSpPr>
+          <p:nvPr>
+            <p:ph type="body"/>
+          </p:nvPr>
+        </p:nvSpPr>
+        <p:spPr>
+          <a:xfrm>
+            <a:off x="6639120" y="3044520"/>
+            <a:ext cx="2921040" cy="1568520"/>
+          </a:xfrm>
+          <a:prstGeom prst="rect">
+            <a:avLst/>
+          </a:prstGeom>
+        </p:spPr>
+        <p:txBody>
+          <a:bodyPr lIns="0" rIns="0" tIns="0" bIns="0">
+            <a:normAutofit/>
+          </a:bodyPr>
+          <a:p>
+            <a:endParaRPr b="0" lang="fr-FR" sz="3200" spc="-1" strike="noStrike">
+              <a:solidFill>
+                <a:srgbClr val="000000"/>
+              </a:solidFill>
+              <a:uFill>
+                <a:solidFill>
+                  <a:srgbClr val="ffffff"/>
+                </a:solidFill>
+              </a:uFill>
+              <a:latin typeface="Arial"/>
+            </a:endParaRPr>
+          </a:p>
+        </p:txBody>
+      </p:sp>
+      <p:sp>
+        <p:nvSpPr>
+          <p:cNvPr id="154" name="PlaceHolder 6"/>
+          <p:cNvSpPr>
+            <a:spLocks noGrp="1"/>
+          </p:cNvSpPr>
+          <p:nvPr>
+            <p:ph type="body"/>
+          </p:nvPr>
+        </p:nvSpPr>
+        <p:spPr>
+          <a:xfrm>
+            <a:off x="3571560" y="3044520"/>
+            <a:ext cx="2921040" cy="1568520"/>
+          </a:xfrm>
+          <a:prstGeom prst="rect">
+            <a:avLst/>
+          </a:prstGeom>
+        </p:spPr>
+        <p:txBody>
+          <a:bodyPr lIns="0" rIns="0" tIns="0" bIns="0">
+            <a:normAutofit/>
+          </a:bodyPr>
+          <a:p>
+            <a:endParaRPr b="0" lang="fr-FR" sz="3200" spc="-1" strike="noStrike">
+              <a:solidFill>
+                <a:srgbClr val="000000"/>
+              </a:solidFill>
+              <a:uFill>
+                <a:solidFill>
+                  <a:srgbClr val="ffffff"/>
+                </a:solidFill>
+              </a:uFill>
+              <a:latin typeface="Arial"/>
+            </a:endParaRPr>
+          </a:p>
+        </p:txBody>
+      </p:sp>
+      <p:sp>
+        <p:nvSpPr>
+          <p:cNvPr id="155" name="PlaceHolder 7"/>
+          <p:cNvSpPr>
+            <a:spLocks noGrp="1"/>
+          </p:cNvSpPr>
+          <p:nvPr>
+            <p:ph type="body"/>
+          </p:nvPr>
+        </p:nvSpPr>
+        <p:spPr>
+          <a:xfrm>
+            <a:off x="504000" y="3044520"/>
+            <a:ext cx="2921040" cy="1568520"/>
           </a:xfrm>
           <a:prstGeom prst="rect">
             <a:avLst/>
@@ -4915,7 +6536,7 @@
         <p:spPr>
           <a:xfrm>
             <a:off x="-58320" y="81000"/>
-            <a:ext cx="7792560" cy="1203840"/>
+            <a:ext cx="7792200" cy="1203480"/>
           </a:xfrm>
           <a:prstGeom prst="rect">
             <a:avLst/>
@@ -5317,7 +6938,7 @@
         <p:spPr>
           <a:xfrm>
             <a:off x="-58320" y="81000"/>
-            <a:ext cx="7792560" cy="1203840"/>
+            <a:ext cx="7792200" cy="1203480"/>
           </a:xfrm>
           <a:prstGeom prst="rect">
             <a:avLst/>
@@ -5719,7 +7340,7 @@
         <p:spPr>
           <a:xfrm>
             <a:off x="-58320" y="81000"/>
-            <a:ext cx="7792560" cy="1203840"/>
+            <a:ext cx="7792200" cy="1203480"/>
           </a:xfrm>
           <a:prstGeom prst="rect">
             <a:avLst/>
@@ -5742,7 +7363,7 @@
         <p:spPr>
           <a:xfrm>
             <a:off x="504000" y="226080"/>
-            <a:ext cx="9072000" cy="946440"/>
+            <a:ext cx="9071640" cy="946080"/>
           </a:xfrm>
           <a:prstGeom prst="rect">
             <a:avLst/>
@@ -5751,9 +7372,8 @@
         <p:txBody>
           <a:bodyPr lIns="0" rIns="0" tIns="0" bIns="0" anchor="ctr"/>
           <a:p>
-            <a:pPr algn="ctr"/>
             <a:r>
-              <a:rPr b="0" lang="fr-FR" sz="4400" spc="-1" strike="noStrike">
+              <a:rPr b="0" lang="fr-FR" sz="1800" spc="-1" strike="noStrike">
                 <a:solidFill>
                   <a:srgbClr val="000000"/>
                 </a:solidFill>
@@ -5766,7 +7386,7 @@
               </a:rPr>
               <a:t>Cliquez pour éditer le format du texte-titre</a:t>
             </a:r>
-            <a:endParaRPr b="0" lang="fr-FR" sz="4400" spc="-1" strike="noStrike">
+            <a:endParaRPr b="0" lang="fr-FR" sz="1800" spc="-1" strike="noStrike">
               <a:solidFill>
                 <a:srgbClr val="000000"/>
               </a:solidFill>
@@ -5793,7 +7413,7 @@
         <p:spPr>
           <a:xfrm>
             <a:off x="504000" y="1326600"/>
-            <a:ext cx="9072000" cy="3288600"/>
+            <a:ext cx="9071640" cy="3288240"/>
           </a:xfrm>
           <a:prstGeom prst="rect">
             <a:avLst/>
@@ -5816,7 +7436,7 @@
               <a:buChar char=""/>
             </a:pPr>
             <a:r>
-              <a:rPr b="0" lang="fr-FR" sz="3200" spc="-1" strike="noStrike">
+              <a:rPr b="0" lang="fr-FR" sz="1800" spc="-1" strike="noStrike">
                 <a:solidFill>
                   <a:srgbClr val="000000"/>
                 </a:solidFill>
@@ -5829,7 +7449,7 @@
               </a:rPr>
               <a:t>Cliquez pour éditer le format du plan de texte</a:t>
             </a:r>
-            <a:endParaRPr b="0" lang="fr-FR" sz="3200" spc="-1" strike="noStrike">
+            <a:endParaRPr b="0" lang="fr-FR" sz="1800" spc="-1" strike="noStrike">
               <a:solidFill>
                 <a:srgbClr val="000000"/>
               </a:solidFill>
@@ -5854,7 +7474,7 @@
               <a:buChar char=""/>
             </a:pPr>
             <a:r>
-              <a:rPr b="0" lang="fr-FR" sz="2800" spc="-1" strike="noStrike">
+              <a:rPr b="0" lang="fr-FR" sz="1800" spc="-1" strike="noStrike">
                 <a:solidFill>
                   <a:srgbClr val="000000"/>
                 </a:solidFill>
@@ -5867,7 +7487,7 @@
               </a:rPr>
               <a:t>Second niveau de plan</a:t>
             </a:r>
-            <a:endParaRPr b="0" lang="fr-FR" sz="2800" spc="-1" strike="noStrike">
+            <a:endParaRPr b="0" lang="fr-FR" sz="1800" spc="-1" strike="noStrike">
               <a:solidFill>
                 <a:srgbClr val="000000"/>
               </a:solidFill>
@@ -5892,7 +7512,7 @@
               <a:buChar char=""/>
             </a:pPr>
             <a:r>
-              <a:rPr b="0" lang="fr-FR" sz="2400" spc="-1" strike="noStrike">
+              <a:rPr b="0" lang="fr-FR" sz="1800" spc="-1" strike="noStrike">
                 <a:solidFill>
                   <a:srgbClr val="000000"/>
                 </a:solidFill>
@@ -5905,7 +7525,7 @@
               </a:rPr>
               <a:t>Troisième niveau de plan</a:t>
             </a:r>
-            <a:endParaRPr b="0" lang="fr-FR" sz="2400" spc="-1" strike="noStrike">
+            <a:endParaRPr b="0" lang="fr-FR" sz="1800" spc="-1" strike="noStrike">
               <a:solidFill>
                 <a:srgbClr val="000000"/>
               </a:solidFill>
@@ -5930,7 +7550,7 @@
               <a:buChar char=""/>
             </a:pPr>
             <a:r>
-              <a:rPr b="0" lang="fr-FR" sz="2000" spc="-1" strike="noStrike">
+              <a:rPr b="0" lang="fr-FR" sz="1800" spc="-1" strike="noStrike">
                 <a:solidFill>
                   <a:srgbClr val="000000"/>
                 </a:solidFill>
@@ -5943,7 +7563,7 @@
               </a:rPr>
               <a:t>Quatrième niveau de plan</a:t>
             </a:r>
-            <a:endParaRPr b="0" lang="fr-FR" sz="2000" spc="-1" strike="noStrike">
+            <a:endParaRPr b="0" lang="fr-FR" sz="1800" spc="-1" strike="noStrike">
               <a:solidFill>
                 <a:srgbClr val="000000"/>
               </a:solidFill>
@@ -5968,7 +7588,7 @@
               <a:buChar char=""/>
             </a:pPr>
             <a:r>
-              <a:rPr b="0" lang="fr-FR" sz="2000" spc="-1" strike="noStrike">
+              <a:rPr b="0" lang="fr-FR" sz="1800" spc="-1" strike="noStrike">
                 <a:solidFill>
                   <a:srgbClr val="000000"/>
                 </a:solidFill>
@@ -5981,7 +7601,7 @@
               </a:rPr>
               <a:t>Cinquième niveau de plan</a:t>
             </a:r>
-            <a:endParaRPr b="0" lang="fr-FR" sz="2000" spc="-1" strike="noStrike">
+            <a:endParaRPr b="0" lang="fr-FR" sz="1800" spc="-1" strike="noStrike">
               <a:solidFill>
                 <a:srgbClr val="000000"/>
               </a:solidFill>
@@ -6006,7 +7626,7 @@
               <a:buChar char=""/>
             </a:pPr>
             <a:r>
-              <a:rPr b="0" lang="fr-FR" sz="2000" spc="-1" strike="noStrike">
+              <a:rPr b="0" lang="fr-FR" sz="1800" spc="-1" strike="noStrike">
                 <a:solidFill>
                   <a:srgbClr val="000000"/>
                 </a:solidFill>
@@ -6019,7 +7639,7 @@
               </a:rPr>
               <a:t>Sixième niveau de plan</a:t>
             </a:r>
-            <a:endParaRPr b="0" lang="fr-FR" sz="2000" spc="-1" strike="noStrike">
+            <a:endParaRPr b="0" lang="fr-FR" sz="1800" spc="-1" strike="noStrike">
               <a:solidFill>
                 <a:srgbClr val="000000"/>
               </a:solidFill>
@@ -6044,7 +7664,7 @@
               <a:buChar char=""/>
             </a:pPr>
             <a:r>
-              <a:rPr b="0" lang="fr-FR" sz="2000" spc="-1" strike="noStrike">
+              <a:rPr b="0" lang="fr-FR" sz="1800" spc="-1" strike="noStrike">
                 <a:solidFill>
                   <a:srgbClr val="000000"/>
                 </a:solidFill>
@@ -6057,7 +7677,7 @@
               </a:rPr>
               <a:t>Septième niveau de plan</a:t>
             </a:r>
-            <a:endParaRPr b="0" lang="fr-FR" sz="2000" spc="-1" strike="noStrike">
+            <a:endParaRPr b="0" lang="fr-FR" sz="1800" spc="-1" strike="noStrike">
               <a:solidFill>
                 <a:srgbClr val="000000"/>
               </a:solidFill>
@@ -6087,6 +7707,408 @@
     <p:sldLayoutId id="2147483684" r:id="rId12"/>
     <p:sldLayoutId id="2147483685" r:id="rId13"/>
     <p:sldLayoutId id="2147483686" r:id="rId14"/>
+  </p:sldLayoutIdLst>
+</p:sldMaster>
+</file>
+
+<file path=ppt/slideMasters/slideMaster4.xml><?xml version="1.0" encoding="utf-8"?>
+<p:sldMaster xmlns:a="http://schemas.openxmlformats.org/drawingml/2006/main" xmlns:p="http://schemas.openxmlformats.org/presentationml/2006/main" xmlns:r="http://schemas.openxmlformats.org/officeDocument/2006/relationships" xmlns:p14="http://schemas.microsoft.com/office/powerpoint/2010/main" xmlns:p15="http://schemas.microsoft.com/office/powerpoint/2012/main" xmlns:mc="http://schemas.openxmlformats.org/markup-compatibility/2006">
+  <p:cSld>
+    <p:spTree>
+      <p:nvGrpSpPr>
+        <p:cNvPr id="1" name=""/>
+        <p:cNvGrpSpPr/>
+        <p:nvPr/>
+      </p:nvGrpSpPr>
+      <p:grpSpPr>
+        <a:xfrm>
+          <a:off x="0" y="0"/>
+          <a:ext cx="0" cy="0"/>
+          <a:chOff x="0" y="0"/>
+          <a:chExt cx="0" cy="0"/>
+        </a:xfrm>
+      </p:grpSpPr>
+      <p:pic>
+        <p:nvPicPr>
+          <p:cNvPr id="117" name="" descr=""/>
+          <p:cNvPicPr/>
+          <p:nvPr/>
+        </p:nvPicPr>
+        <p:blipFill>
+          <a:blip r:embed="rId2"/>
+          <a:stretch/>
+        </p:blipFill>
+        <p:spPr>
+          <a:xfrm>
+            <a:off x="-58320" y="81000"/>
+            <a:ext cx="7792200" cy="1203480"/>
+          </a:xfrm>
+          <a:prstGeom prst="rect">
+            <a:avLst/>
+          </a:prstGeom>
+          <a:ln>
+            <a:noFill/>
+          </a:ln>
+        </p:spPr>
+      </p:pic>
+      <p:sp>
+        <p:nvSpPr>
+          <p:cNvPr id="118" name="PlaceHolder 1"/>
+          <p:cNvSpPr>
+            <a:spLocks noGrp="1"/>
+          </p:cNvSpPr>
+          <p:nvPr>
+            <p:ph type="title"/>
+          </p:nvPr>
+        </p:nvSpPr>
+        <p:spPr>
+          <a:xfrm>
+            <a:off x="504000" y="226080"/>
+            <a:ext cx="9072000" cy="946440"/>
+          </a:xfrm>
+          <a:prstGeom prst="rect">
+            <a:avLst/>
+          </a:prstGeom>
+        </p:spPr>
+        <p:txBody>
+          <a:bodyPr lIns="0" rIns="0" tIns="0" bIns="0" anchor="ctr"/>
+          <a:p>
+            <a:pPr algn="ctr"/>
+            <a:r>
+              <a:rPr b="0" lang="fr-FR" sz="4400" spc="-1" strike="noStrike">
+                <a:solidFill>
+                  <a:srgbClr val="000000"/>
+                </a:solidFill>
+                <a:uFill>
+                  <a:solidFill>
+                    <a:srgbClr val="ffffff"/>
+                  </a:solidFill>
+                </a:uFill>
+                <a:latin typeface="Arial"/>
+              </a:rPr>
+              <a:t>Cliquez pour éditer le format du texte-titre</a:t>
+            </a:r>
+            <a:endParaRPr b="0" lang="fr-FR" sz="4400" spc="-1" strike="noStrike">
+              <a:solidFill>
+                <a:srgbClr val="000000"/>
+              </a:solidFill>
+              <a:uFill>
+                <a:solidFill>
+                  <a:srgbClr val="ffffff"/>
+                </a:solidFill>
+              </a:uFill>
+              <a:latin typeface="Arial"/>
+            </a:endParaRPr>
+          </a:p>
+        </p:txBody>
+      </p:sp>
+      <p:sp>
+        <p:nvSpPr>
+          <p:cNvPr id="119" name="PlaceHolder 2"/>
+          <p:cNvSpPr>
+            <a:spLocks noGrp="1"/>
+          </p:cNvSpPr>
+          <p:nvPr>
+            <p:ph type="body"/>
+          </p:nvPr>
+        </p:nvSpPr>
+        <p:spPr>
+          <a:xfrm>
+            <a:off x="504000" y="1326600"/>
+            <a:ext cx="9072000" cy="3288600"/>
+          </a:xfrm>
+          <a:prstGeom prst="rect">
+            <a:avLst/>
+          </a:prstGeom>
+        </p:spPr>
+        <p:txBody>
+          <a:bodyPr lIns="0" rIns="0" tIns="0" bIns="0">
+            <a:normAutofit/>
+          </a:bodyPr>
+          <a:p>
+            <a:pPr marL="432000" indent="-324000">
+              <a:spcBef>
+                <a:spcPts val="1417"/>
+              </a:spcBef>
+              <a:buClr>
+                <a:srgbClr val="000000"/>
+              </a:buClr>
+              <a:buSzPct val="45000"/>
+              <a:buFont typeface="Wingdings" charset="2"/>
+              <a:buChar char=""/>
+            </a:pPr>
+            <a:r>
+              <a:rPr b="0" lang="fr-FR" sz="3200" spc="-1" strike="noStrike">
+                <a:solidFill>
+                  <a:srgbClr val="000000"/>
+                </a:solidFill>
+                <a:uFill>
+                  <a:solidFill>
+                    <a:srgbClr val="ffffff"/>
+                  </a:solidFill>
+                </a:uFill>
+                <a:latin typeface="Arial"/>
+              </a:rPr>
+              <a:t>Cliquez pour éditer le format du plan de texte</a:t>
+            </a:r>
+            <a:endParaRPr b="0" lang="fr-FR" sz="3200" spc="-1" strike="noStrike">
+              <a:solidFill>
+                <a:srgbClr val="000000"/>
+              </a:solidFill>
+              <a:uFill>
+                <a:solidFill>
+                  <a:srgbClr val="ffffff"/>
+                </a:solidFill>
+              </a:uFill>
+              <a:latin typeface="Arial"/>
+            </a:endParaRPr>
+          </a:p>
+          <a:p>
+            <a:pPr lvl="1" marL="864000" indent="-324000">
+              <a:spcBef>
+                <a:spcPts val="1134"/>
+              </a:spcBef>
+              <a:buClr>
+                <a:srgbClr val="000000"/>
+              </a:buClr>
+              <a:buSzPct val="75000"/>
+              <a:buFont typeface="Symbol" charset="2"/>
+              <a:buChar char=""/>
+            </a:pPr>
+            <a:r>
+              <a:rPr b="0" lang="fr-FR" sz="2800" spc="-1" strike="noStrike">
+                <a:solidFill>
+                  <a:srgbClr val="000000"/>
+                </a:solidFill>
+                <a:uFill>
+                  <a:solidFill>
+                    <a:srgbClr val="ffffff"/>
+                  </a:solidFill>
+                </a:uFill>
+                <a:latin typeface="Arial"/>
+              </a:rPr>
+              <a:t>Second niveau de plan</a:t>
+            </a:r>
+            <a:endParaRPr b="0" lang="fr-FR" sz="2800" spc="-1" strike="noStrike">
+              <a:solidFill>
+                <a:srgbClr val="000000"/>
+              </a:solidFill>
+              <a:uFill>
+                <a:solidFill>
+                  <a:srgbClr val="ffffff"/>
+                </a:solidFill>
+              </a:uFill>
+              <a:latin typeface="Arial"/>
+            </a:endParaRPr>
+          </a:p>
+          <a:p>
+            <a:pPr lvl="2" marL="1296000" indent="-288000">
+              <a:spcBef>
+                <a:spcPts val="850"/>
+              </a:spcBef>
+              <a:buClr>
+                <a:srgbClr val="000000"/>
+              </a:buClr>
+              <a:buSzPct val="45000"/>
+              <a:buFont typeface="Wingdings" charset="2"/>
+              <a:buChar char=""/>
+            </a:pPr>
+            <a:r>
+              <a:rPr b="0" lang="fr-FR" sz="2400" spc="-1" strike="noStrike">
+                <a:solidFill>
+                  <a:srgbClr val="000000"/>
+                </a:solidFill>
+                <a:uFill>
+                  <a:solidFill>
+                    <a:srgbClr val="ffffff"/>
+                  </a:solidFill>
+                </a:uFill>
+                <a:latin typeface="Arial"/>
+              </a:rPr>
+              <a:t>Troisième niveau de plan</a:t>
+            </a:r>
+            <a:endParaRPr b="0" lang="fr-FR" sz="2400" spc="-1" strike="noStrike">
+              <a:solidFill>
+                <a:srgbClr val="000000"/>
+              </a:solidFill>
+              <a:uFill>
+                <a:solidFill>
+                  <a:srgbClr val="ffffff"/>
+                </a:solidFill>
+              </a:uFill>
+              <a:latin typeface="Arial"/>
+            </a:endParaRPr>
+          </a:p>
+          <a:p>
+            <a:pPr lvl="3" marL="1728000" indent="-216000">
+              <a:spcBef>
+                <a:spcPts val="567"/>
+              </a:spcBef>
+              <a:buClr>
+                <a:srgbClr val="000000"/>
+              </a:buClr>
+              <a:buSzPct val="75000"/>
+              <a:buFont typeface="Symbol" charset="2"/>
+              <a:buChar char=""/>
+            </a:pPr>
+            <a:r>
+              <a:rPr b="0" lang="fr-FR" sz="2000" spc="-1" strike="noStrike">
+                <a:solidFill>
+                  <a:srgbClr val="000000"/>
+                </a:solidFill>
+                <a:uFill>
+                  <a:solidFill>
+                    <a:srgbClr val="ffffff"/>
+                  </a:solidFill>
+                </a:uFill>
+                <a:latin typeface="Arial"/>
+              </a:rPr>
+              <a:t>Quatrième niveau de plan</a:t>
+            </a:r>
+            <a:endParaRPr b="0" lang="fr-FR" sz="2000" spc="-1" strike="noStrike">
+              <a:solidFill>
+                <a:srgbClr val="000000"/>
+              </a:solidFill>
+              <a:uFill>
+                <a:solidFill>
+                  <a:srgbClr val="ffffff"/>
+                </a:solidFill>
+              </a:uFill>
+              <a:latin typeface="Arial"/>
+            </a:endParaRPr>
+          </a:p>
+          <a:p>
+            <a:pPr lvl="4" marL="2160000" indent="-216000">
+              <a:spcBef>
+                <a:spcPts val="283"/>
+              </a:spcBef>
+              <a:buClr>
+                <a:srgbClr val="000000"/>
+              </a:buClr>
+              <a:buSzPct val="45000"/>
+              <a:buFont typeface="Wingdings" charset="2"/>
+              <a:buChar char=""/>
+            </a:pPr>
+            <a:r>
+              <a:rPr b="0" lang="fr-FR" sz="2000" spc="-1" strike="noStrike">
+                <a:solidFill>
+                  <a:srgbClr val="000000"/>
+                </a:solidFill>
+                <a:uFill>
+                  <a:solidFill>
+                    <a:srgbClr val="ffffff"/>
+                  </a:solidFill>
+                </a:uFill>
+                <a:latin typeface="Arial"/>
+              </a:rPr>
+              <a:t>Cinquième niveau de plan</a:t>
+            </a:r>
+            <a:endParaRPr b="0" lang="fr-FR" sz="2000" spc="-1" strike="noStrike">
+              <a:solidFill>
+                <a:srgbClr val="000000"/>
+              </a:solidFill>
+              <a:uFill>
+                <a:solidFill>
+                  <a:srgbClr val="ffffff"/>
+                </a:solidFill>
+              </a:uFill>
+              <a:latin typeface="Arial"/>
+            </a:endParaRPr>
+          </a:p>
+          <a:p>
+            <a:pPr lvl="5" marL="2592000" indent="-216000">
+              <a:spcBef>
+                <a:spcPts val="283"/>
+              </a:spcBef>
+              <a:buClr>
+                <a:srgbClr val="000000"/>
+              </a:buClr>
+              <a:buSzPct val="45000"/>
+              <a:buFont typeface="Wingdings" charset="2"/>
+              <a:buChar char=""/>
+            </a:pPr>
+            <a:r>
+              <a:rPr b="0" lang="fr-FR" sz="2000" spc="-1" strike="noStrike">
+                <a:solidFill>
+                  <a:srgbClr val="000000"/>
+                </a:solidFill>
+                <a:uFill>
+                  <a:solidFill>
+                    <a:srgbClr val="ffffff"/>
+                  </a:solidFill>
+                </a:uFill>
+                <a:latin typeface="Arial"/>
+              </a:rPr>
+              <a:t>Sixième niveau de plan</a:t>
+            </a:r>
+            <a:endParaRPr b="0" lang="fr-FR" sz="2000" spc="-1" strike="noStrike">
+              <a:solidFill>
+                <a:srgbClr val="000000"/>
+              </a:solidFill>
+              <a:uFill>
+                <a:solidFill>
+                  <a:srgbClr val="ffffff"/>
+                </a:solidFill>
+              </a:uFill>
+              <a:latin typeface="Arial"/>
+            </a:endParaRPr>
+          </a:p>
+          <a:p>
+            <a:pPr lvl="6" marL="3024000" indent="-216000">
+              <a:spcBef>
+                <a:spcPts val="283"/>
+              </a:spcBef>
+              <a:buClr>
+                <a:srgbClr val="000000"/>
+              </a:buClr>
+              <a:buSzPct val="45000"/>
+              <a:buFont typeface="Wingdings" charset="2"/>
+              <a:buChar char=""/>
+            </a:pPr>
+            <a:r>
+              <a:rPr b="0" lang="fr-FR" sz="2000" spc="-1" strike="noStrike">
+                <a:solidFill>
+                  <a:srgbClr val="000000"/>
+                </a:solidFill>
+                <a:uFill>
+                  <a:solidFill>
+                    <a:srgbClr val="ffffff"/>
+                  </a:solidFill>
+                </a:uFill>
+                <a:latin typeface="Arial"/>
+              </a:rPr>
+              <a:t>Septième niveau de plan</a:t>
+            </a:r>
+            <a:endParaRPr b="0" lang="fr-FR" sz="2000" spc="-1" strike="noStrike">
+              <a:solidFill>
+                <a:srgbClr val="000000"/>
+              </a:solidFill>
+              <a:uFill>
+                <a:solidFill>
+                  <a:srgbClr val="ffffff"/>
+                </a:solidFill>
+              </a:uFill>
+              <a:latin typeface="Arial"/>
+            </a:endParaRPr>
+          </a:p>
+        </p:txBody>
+      </p:sp>
+    </p:spTree>
+  </p:cSld>
+  <p:clrMap bg1="lt1" bg2="lt2" tx1="dk1" tx2="dk2" accent1="accent1" accent2="accent2" accent3="accent3" accent4="accent4" accent5="accent5" accent6="accent6" hlink="hlink" folHlink="folHlink"/>
+  <p:sldLayoutIdLst>
+    <p:sldLayoutId id="2147483688" r:id="rId3"/>
+    <p:sldLayoutId id="2147483689" r:id="rId4"/>
+    <p:sldLayoutId id="2147483690" r:id="rId5"/>
+    <p:sldLayoutId id="2147483691" r:id="rId6"/>
+    <p:sldLayoutId id="2147483692" r:id="rId7"/>
+    <p:sldLayoutId id="2147483693" r:id="rId8"/>
+    <p:sldLayoutId id="2147483694" r:id="rId9"/>
+    <p:sldLayoutId id="2147483695" r:id="rId10"/>
+    <p:sldLayoutId id="2147483696" r:id="rId11"/>
+    <p:sldLayoutId id="2147483697" r:id="rId12"/>
+    <p:sldLayoutId id="2147483698" r:id="rId13"/>
+    <p:sldLayoutId id="2147483699" r:id="rId14"/>
   </p:sldLayoutIdLst>
 </p:sldMaster>
 </file>
@@ -6110,14 +8132,14 @@
       </p:grpSpPr>
       <p:sp>
         <p:nvSpPr>
-          <p:cNvPr id="117" name="CustomShape 1"/>
+          <p:cNvPr id="156" name="CustomShape 1"/>
           <p:cNvSpPr/>
           <p:nvPr/>
         </p:nvSpPr>
         <p:spPr>
           <a:xfrm>
             <a:off x="504000" y="216000"/>
-            <a:ext cx="7018200" cy="934200"/>
+            <a:ext cx="7017840" cy="933840"/>
           </a:xfrm>
           <a:prstGeom prst="rect">
             <a:avLst/>
@@ -6167,14 +8189,14 @@
       </p:sp>
       <p:sp>
         <p:nvSpPr>
-          <p:cNvPr id="118" name="CustomShape 2"/>
+          <p:cNvPr id="157" name="CustomShape 2"/>
           <p:cNvSpPr/>
           <p:nvPr/>
         </p:nvSpPr>
         <p:spPr>
           <a:xfrm>
             <a:off x="504000" y="1368000"/>
-            <a:ext cx="9070200" cy="3286440"/>
+            <a:ext cx="9069840" cy="3286080"/>
           </a:xfrm>
           <a:prstGeom prst="rect">
             <a:avLst/>
@@ -6311,14 +8333,14 @@
       </p:grpSpPr>
       <p:sp>
         <p:nvSpPr>
-          <p:cNvPr id="166" name="CustomShape 1"/>
+          <p:cNvPr id="196" name="CustomShape 1"/>
           <p:cNvSpPr/>
           <p:nvPr/>
         </p:nvSpPr>
         <p:spPr>
           <a:xfrm>
             <a:off x="504000" y="226080"/>
-            <a:ext cx="9070920" cy="945360"/>
+            <a:ext cx="9070560" cy="945000"/>
           </a:xfrm>
           <a:prstGeom prst="rect">
             <a:avLst/>
@@ -6368,14 +8390,14 @@
       </p:sp>
       <p:sp>
         <p:nvSpPr>
-          <p:cNvPr id="167" name="CustomShape 2"/>
+          <p:cNvPr id="197" name="CustomShape 2"/>
           <p:cNvSpPr/>
           <p:nvPr/>
         </p:nvSpPr>
         <p:spPr>
           <a:xfrm>
             <a:off x="504000" y="1614600"/>
-            <a:ext cx="9070920" cy="3287520"/>
+            <a:ext cx="9070560" cy="3287160"/>
           </a:xfrm>
           <a:prstGeom prst="rect">
             <a:avLst/>
@@ -6396,7 +8418,7 @@
             <a:normAutofit/>
           </a:bodyPr>
           <a:p>
-            <a:pPr marL="432000" indent="-322920" algn="just">
+            <a:pPr marL="432000" indent="-322560" algn="just">
               <a:lnSpc>
                 <a:spcPct val="100000"/>
               </a:lnSpc>
@@ -6438,7 +8460,7 @@
             </a:endParaRPr>
           </a:p>
           <a:p>
-            <a:pPr marL="432000" indent="-322920" algn="just">
+            <a:pPr marL="432000" indent="-322560" algn="just">
               <a:lnSpc>
                 <a:spcPct val="100000"/>
               </a:lnSpc>
@@ -6465,7 +8487,7 @@
                 <a:latin typeface="Arial"/>
                 <a:ea typeface="DejaVu Sans"/>
               </a:rPr>
-              <a:t>Pour ce faire, il doit d’abord parcourir l’application pour aboutir à un produit de substitution, et l’enregistrer par l’intermédiaire du menu de description de produit ‘1).</a:t>
+              <a:t>Pour ce faire, il doit d’abord parcourir l’application pour aboutir à un produit de substitution, et l’enregistrer par l’intermédiaire du menu de description de substitut sélectionné (1).</a:t>
             </a:r>
             <a:endParaRPr b="0" lang="fr-FR" sz="2600" spc="-1" strike="noStrike">
               <a:solidFill>
@@ -6480,7 +8502,7 @@
             </a:endParaRPr>
           </a:p>
           <a:p>
-            <a:pPr marL="432000" indent="-322920" algn="just">
+            <a:pPr marL="432000" indent="-322560" algn="just">
               <a:lnSpc>
                 <a:spcPct val="100000"/>
               </a:lnSpc>
@@ -6507,7 +8529,7 @@
                 <a:latin typeface="Arial"/>
                 <a:ea typeface="DejaVu Sans"/>
               </a:rPr>
-              <a:t>Puis il peut accéder à partir du menu d’accueil au menu de gestion des favoris. C’est ici qu’il peut les consulter, et les supprimer (2)</a:t>
+              <a:t>Puis il peut accéder à partir du menu d’accueil au menu de gestion des favoris. C’est ici qu’il peut les consulter, et les supprimer (2).</a:t>
             </a:r>
             <a:endParaRPr b="0" lang="fr-FR" sz="2600" spc="-1" strike="noStrike">
               <a:solidFill>
@@ -6572,61 +8594,9 @@
           <a:chExt cx="0" cy="0"/>
         </a:xfrm>
       </p:grpSpPr>
-      <p:sp>
-        <p:nvSpPr>
-          <p:cNvPr id="168" name="CustomShape 1"/>
-          <p:cNvSpPr/>
-          <p:nvPr/>
-        </p:nvSpPr>
-        <p:spPr>
-          <a:xfrm>
-            <a:off x="504000" y="226080"/>
-            <a:ext cx="9070920" cy="945360"/>
-          </a:xfrm>
-          <a:prstGeom prst="rect">
-            <a:avLst/>
-          </a:prstGeom>
-          <a:noFill/>
-          <a:ln>
-            <a:noFill/>
-          </a:ln>
-        </p:spPr>
-        <p:style>
-          <a:lnRef idx="0"/>
-          <a:fillRef idx="0"/>
-          <a:effectRef idx="0"/>
-          <a:fontRef idx="minor"/>
-        </p:style>
-      </p:sp>
-      <p:sp>
-        <p:nvSpPr>
-          <p:cNvPr id="169" name="CustomShape 2"/>
-          <p:cNvSpPr/>
-          <p:nvPr/>
-        </p:nvSpPr>
-        <p:spPr>
-          <a:xfrm>
-            <a:off x="504000" y="1326600"/>
-            <a:ext cx="9070920" cy="3287520"/>
-          </a:xfrm>
-          <a:prstGeom prst="rect">
-            <a:avLst/>
-          </a:prstGeom>
-          <a:noFill/>
-          <a:ln>
-            <a:noFill/>
-          </a:ln>
-        </p:spPr>
-        <p:style>
-          <a:lnRef idx="0"/>
-          <a:fillRef idx="0"/>
-          <a:effectRef idx="0"/>
-          <a:fontRef idx="minor"/>
-        </p:style>
-      </p:sp>
       <p:pic>
         <p:nvPicPr>
-          <p:cNvPr id="170" name="" descr=""/>
+          <p:cNvPr id="198" name="" descr=""/>
           <p:cNvPicPr/>
           <p:nvPr/>
         </p:nvPicPr>
@@ -6636,8 +8606,8 @@
         </p:blipFill>
         <p:spPr>
           <a:xfrm>
-            <a:off x="17280" y="1008000"/>
-            <a:ext cx="5022720" cy="3456000"/>
+            <a:off x="4977720" y="72000"/>
+            <a:ext cx="4814280" cy="5598360"/>
           </a:xfrm>
           <a:prstGeom prst="rect">
             <a:avLst/>
@@ -6647,16 +8617,39 @@
           </a:ln>
         </p:spPr>
       </p:pic>
-      <p:sp>
-        <p:nvSpPr>
-          <p:cNvPr id="171" name="TextShape 3"/>
-          <p:cNvSpPr txBox="1"/>
+      <p:pic>
+        <p:nvPicPr>
+          <p:cNvPr id="199" name="" descr=""/>
+          <p:cNvPicPr/>
           <p:nvPr/>
-        </p:nvSpPr>
-        <p:spPr>
-          <a:xfrm>
-            <a:off x="4536000" y="2736000"/>
-            <a:ext cx="504000" cy="402840"/>
+        </p:nvPicPr>
+        <p:blipFill>
+          <a:blip r:embed="rId2"/>
+          <a:stretch/>
+        </p:blipFill>
+        <p:spPr>
+          <a:xfrm>
+            <a:off x="83880" y="1326600"/>
+            <a:ext cx="5172120" cy="3065400"/>
+          </a:xfrm>
+          <a:prstGeom prst="rect">
+            <a:avLst/>
+          </a:prstGeom>
+          <a:ln>
+            <a:noFill/>
+          </a:ln>
+        </p:spPr>
+      </p:pic>
+      <p:sp>
+        <p:nvSpPr>
+          <p:cNvPr id="200" name="CustomShape 1"/>
+          <p:cNvSpPr/>
+          <p:nvPr/>
+        </p:nvSpPr>
+        <p:spPr>
+          <a:xfrm>
+            <a:off x="504000" y="226080"/>
+            <a:ext cx="9070560" cy="945000"/>
           </a:xfrm>
           <a:prstGeom prst="rect">
             <a:avLst/>
@@ -6666,6 +8659,64 @@
             <a:noFill/>
           </a:ln>
         </p:spPr>
+        <p:style>
+          <a:lnRef idx="0"/>
+          <a:fillRef idx="0"/>
+          <a:effectRef idx="0"/>
+          <a:fontRef idx="minor"/>
+        </p:style>
+      </p:sp>
+      <p:sp>
+        <p:nvSpPr>
+          <p:cNvPr id="201" name="CustomShape 2"/>
+          <p:cNvSpPr/>
+          <p:nvPr/>
+        </p:nvSpPr>
+        <p:spPr>
+          <a:xfrm>
+            <a:off x="504000" y="1326600"/>
+            <a:ext cx="9070560" cy="3287160"/>
+          </a:xfrm>
+          <a:prstGeom prst="rect">
+            <a:avLst/>
+          </a:prstGeom>
+          <a:noFill/>
+          <a:ln>
+            <a:noFill/>
+          </a:ln>
+        </p:spPr>
+        <p:style>
+          <a:lnRef idx="0"/>
+          <a:fillRef idx="0"/>
+          <a:effectRef idx="0"/>
+          <a:fontRef idx="minor"/>
+        </p:style>
+      </p:sp>
+      <p:sp>
+        <p:nvSpPr>
+          <p:cNvPr id="202" name="CustomShape 3"/>
+          <p:cNvSpPr/>
+          <p:nvPr/>
+        </p:nvSpPr>
+        <p:spPr>
+          <a:xfrm>
+            <a:off x="4464000" y="3096000"/>
+            <a:ext cx="503640" cy="402480"/>
+          </a:xfrm>
+          <a:prstGeom prst="rect">
+            <a:avLst/>
+          </a:prstGeom>
+          <a:noFill/>
+          <a:ln>
+            <a:noFill/>
+          </a:ln>
+        </p:spPr>
+        <p:style>
+          <a:lnRef idx="0"/>
+          <a:fillRef idx="0"/>
+          <a:effectRef idx="0"/>
+          <a:fontRef idx="minor"/>
+        </p:style>
         <p:txBody>
           <a:bodyPr lIns="90000" rIns="90000" tIns="45000" bIns="45000"/>
           <a:p>
@@ -6683,53 +8734,30 @@
               </a:rPr>
               <a:t>1</a:t>
             </a:r>
-            <a:endParaRPr b="1" lang="fr-FR" sz="2200" spc="-1" strike="noStrike">
-              <a:solidFill>
-                <a:srgbClr val="007fff"/>
-              </a:solidFill>
-              <a:uFill>
-                <a:solidFill>
-                  <a:srgbClr val="ffffff"/>
-                </a:solidFill>
-              </a:uFill>
-              <a:latin typeface="Arial"/>
-            </a:endParaRPr>
-          </a:p>
-        </p:txBody>
-      </p:sp>
-      <p:pic>
-        <p:nvPicPr>
-          <p:cNvPr id="172" name="" descr=""/>
-          <p:cNvPicPr/>
+            <a:endParaRPr b="0" lang="fr-FR" sz="2200" spc="-1" strike="noStrike">
+              <a:solidFill>
+                <a:srgbClr val="000000"/>
+              </a:solidFill>
+              <a:uFill>
+                <a:solidFill>
+                  <a:srgbClr val="ffffff"/>
+                </a:solidFill>
+              </a:uFill>
+              <a:latin typeface="Arial"/>
+            </a:endParaRPr>
+          </a:p>
+        </p:txBody>
+      </p:sp>
+      <p:sp>
+        <p:nvSpPr>
+          <p:cNvPr id="203" name="CustomShape 4"/>
+          <p:cNvSpPr/>
           <p:nvPr/>
-        </p:nvPicPr>
-        <p:blipFill>
-          <a:blip r:embed="rId2"/>
-          <a:stretch/>
-        </p:blipFill>
-        <p:spPr>
-          <a:xfrm>
-            <a:off x="5040000" y="238320"/>
-            <a:ext cx="5019840" cy="4873680"/>
-          </a:xfrm>
-          <a:prstGeom prst="rect">
-            <a:avLst/>
-          </a:prstGeom>
-          <a:ln>
-            <a:noFill/>
-          </a:ln>
-        </p:spPr>
-      </p:pic>
-      <p:sp>
-        <p:nvSpPr>
-          <p:cNvPr id="173" name="TextShape 4"/>
-          <p:cNvSpPr txBox="1"/>
-          <p:nvPr/>
-        </p:nvSpPr>
-        <p:spPr>
-          <a:xfrm>
-            <a:off x="9360000" y="2664000"/>
-            <a:ext cx="504000" cy="402840"/>
+        </p:nvSpPr>
+        <p:spPr>
+          <a:xfrm>
+            <a:off x="9324000" y="2988000"/>
+            <a:ext cx="503640" cy="402480"/>
           </a:xfrm>
           <a:prstGeom prst="rect">
             <a:avLst/>
@@ -6739,6 +8767,12 @@
             <a:noFill/>
           </a:ln>
         </p:spPr>
+        <p:style>
+          <a:lnRef idx="0"/>
+          <a:fillRef idx="0"/>
+          <a:effectRef idx="0"/>
+          <a:fontRef idx="minor"/>
+        </p:style>
         <p:txBody>
           <a:bodyPr lIns="90000" rIns="90000" tIns="45000" bIns="45000"/>
           <a:p>
@@ -6756,9 +8790,9 @@
               </a:rPr>
               <a:t>2</a:t>
             </a:r>
-            <a:endParaRPr b="1" lang="fr-FR" sz="2200" spc="-1" strike="noStrike">
-              <a:solidFill>
-                <a:srgbClr val="007fff"/>
+            <a:endParaRPr b="0" lang="fr-FR" sz="2200" spc="-1" strike="noStrike">
+              <a:solidFill>
+                <a:srgbClr val="000000"/>
               </a:solidFill>
               <a:uFill>
                 <a:solidFill>
@@ -6821,14 +8855,14 @@
       </p:grpSpPr>
       <p:sp>
         <p:nvSpPr>
-          <p:cNvPr id="174" name="CustomShape 1"/>
+          <p:cNvPr id="204" name="CustomShape 1"/>
           <p:cNvSpPr/>
           <p:nvPr/>
         </p:nvSpPr>
         <p:spPr>
           <a:xfrm>
             <a:off x="504000" y="216000"/>
-            <a:ext cx="7018200" cy="934200"/>
+            <a:ext cx="7017840" cy="933840"/>
           </a:xfrm>
           <a:prstGeom prst="rect">
             <a:avLst/>
@@ -6878,14 +8912,14 @@
       </p:sp>
       <p:sp>
         <p:nvSpPr>
-          <p:cNvPr id="175" name="CustomShape 2"/>
+          <p:cNvPr id="205" name="CustomShape 2"/>
           <p:cNvSpPr/>
           <p:nvPr/>
         </p:nvSpPr>
         <p:spPr>
           <a:xfrm>
             <a:off x="504000" y="1512000"/>
-            <a:ext cx="9070200" cy="3286440"/>
+            <a:ext cx="9069840" cy="3286080"/>
           </a:xfrm>
           <a:prstGeom prst="rect">
             <a:avLst/>
@@ -6906,7 +8940,7 @@
             <a:normAutofit/>
           </a:bodyPr>
           <a:p>
-            <a:pPr marL="432000" indent="-322200" algn="just">
+            <a:pPr marL="432000" indent="-321840" algn="just">
               <a:lnSpc>
                 <a:spcPct val="100000"/>
               </a:lnSpc>
@@ -7000,14 +9034,14 @@
       </p:grpSpPr>
       <p:sp>
         <p:nvSpPr>
-          <p:cNvPr id="119" name="CustomShape 1"/>
+          <p:cNvPr id="158" name="CustomShape 1"/>
           <p:cNvSpPr/>
           <p:nvPr/>
         </p:nvSpPr>
         <p:spPr>
           <a:xfrm>
             <a:off x="504000" y="216000"/>
-            <a:ext cx="7018200" cy="934200"/>
+            <a:ext cx="7017840" cy="933840"/>
           </a:xfrm>
           <a:prstGeom prst="rect">
             <a:avLst/>
@@ -7057,14 +9091,14 @@
       </p:sp>
       <p:sp>
         <p:nvSpPr>
-          <p:cNvPr id="120" name="CustomShape 2"/>
+          <p:cNvPr id="159" name="CustomShape 2"/>
           <p:cNvSpPr/>
           <p:nvPr/>
         </p:nvSpPr>
         <p:spPr>
           <a:xfrm>
             <a:off x="432000" y="1823760"/>
-            <a:ext cx="9070200" cy="3286440"/>
+            <a:ext cx="9069840" cy="3286080"/>
           </a:xfrm>
           <a:prstGeom prst="rect">
             <a:avLst/>
@@ -7085,7 +9119,7 @@
             <a:normAutofit/>
           </a:bodyPr>
           <a:p>
-            <a:pPr marL="432000" indent="-322200">
+            <a:pPr marL="432000" indent="-321840">
               <a:lnSpc>
                 <a:spcPct val="100000"/>
               </a:lnSpc>
@@ -7127,7 +9161,7 @@
             </a:endParaRPr>
           </a:p>
           <a:p>
-            <a:pPr marL="432000" indent="-322200">
+            <a:pPr marL="432000" indent="-321840">
               <a:lnSpc>
                 <a:spcPct val="100000"/>
               </a:lnSpc>
@@ -7169,7 +9203,7 @@
             </a:endParaRPr>
           </a:p>
           <a:p>
-            <a:pPr marL="432000" indent="-322200">
+            <a:pPr marL="432000" indent="-321840">
               <a:lnSpc>
                 <a:spcPct val="100000"/>
               </a:lnSpc>
@@ -7211,7 +9245,7 @@
             </a:endParaRPr>
           </a:p>
           <a:p>
-            <a:pPr marL="432000" indent="-322200">
+            <a:pPr marL="432000" indent="-321840">
               <a:lnSpc>
                 <a:spcPct val="100000"/>
               </a:lnSpc>
@@ -7253,7 +9287,7 @@
             </a:endParaRPr>
           </a:p>
           <a:p>
-            <a:pPr marL="432000" indent="-322200">
+            <a:pPr marL="432000" indent="-321840">
               <a:lnSpc>
                 <a:spcPct val="100000"/>
               </a:lnSpc>
@@ -7347,14 +9381,14 @@
       </p:grpSpPr>
       <p:sp>
         <p:nvSpPr>
-          <p:cNvPr id="121" name="CustomShape 1"/>
+          <p:cNvPr id="160" name="CustomShape 1"/>
           <p:cNvSpPr/>
           <p:nvPr/>
         </p:nvSpPr>
         <p:spPr>
           <a:xfrm>
             <a:off x="504000" y="216000"/>
-            <a:ext cx="7018200" cy="934200"/>
+            <a:ext cx="7017840" cy="933840"/>
           </a:xfrm>
           <a:prstGeom prst="rect">
             <a:avLst/>
@@ -7404,14 +9438,14 @@
       </p:sp>
       <p:sp>
         <p:nvSpPr>
-          <p:cNvPr id="122" name="CustomShape 2"/>
+          <p:cNvPr id="161" name="CustomShape 2"/>
           <p:cNvSpPr/>
           <p:nvPr/>
         </p:nvSpPr>
         <p:spPr>
           <a:xfrm>
             <a:off x="504000" y="1728000"/>
-            <a:ext cx="9070200" cy="3286440"/>
+            <a:ext cx="9069840" cy="3286080"/>
           </a:xfrm>
           <a:prstGeom prst="rect">
             <a:avLst/>
@@ -7432,7 +9466,7 @@
             <a:normAutofit/>
           </a:bodyPr>
           <a:p>
-            <a:pPr marL="432000" indent="-322200" algn="just">
+            <a:pPr marL="432000" indent="-321840" algn="just">
               <a:lnSpc>
                 <a:spcPct val="100000"/>
               </a:lnSpc>
@@ -7474,7 +9508,7 @@
             </a:endParaRPr>
           </a:p>
           <a:p>
-            <a:pPr marL="432000" indent="-322200" algn="just">
+            <a:pPr marL="432000" indent="-321840" algn="just">
               <a:lnSpc>
                 <a:spcPct val="100000"/>
               </a:lnSpc>
@@ -7516,7 +9550,7 @@
             </a:endParaRPr>
           </a:p>
           <a:p>
-            <a:pPr lvl="1" marL="432000" indent="-216000" algn="just">
+            <a:pPr lvl="1" marL="432000" indent="-215640" algn="just">
               <a:lnSpc>
                 <a:spcPct val="100000"/>
               </a:lnSpc>
@@ -7558,7 +9592,7 @@
             </a:endParaRPr>
           </a:p>
           <a:p>
-            <a:pPr lvl="1" marL="432000" indent="-216000" algn="just">
+            <a:pPr lvl="1" marL="432000" indent="-215640" algn="just">
               <a:lnSpc>
                 <a:spcPct val="100000"/>
               </a:lnSpc>
@@ -7600,7 +9634,7 @@
             </a:endParaRPr>
           </a:p>
           <a:p>
-            <a:pPr lvl="1" marL="432000" indent="-216000" algn="just">
+            <a:pPr lvl="1" marL="432000" indent="-215640" algn="just">
               <a:lnSpc>
                 <a:spcPct val="100000"/>
               </a:lnSpc>
@@ -7713,232 +9747,9 @@
           <a:chExt cx="0" cy="0"/>
         </a:xfrm>
       </p:grpSpPr>
-      <p:sp>
-        <p:nvSpPr>
-          <p:cNvPr id="123" name="CustomShape 1"/>
-          <p:cNvSpPr/>
-          <p:nvPr/>
-        </p:nvSpPr>
-        <p:spPr>
-          <a:xfrm>
-            <a:off x="504000" y="216000"/>
-            <a:ext cx="7018200" cy="934200"/>
-          </a:xfrm>
-          <a:prstGeom prst="rect">
-            <a:avLst/>
-          </a:prstGeom>
-          <a:noFill/>
-          <a:ln>
-            <a:noFill/>
-          </a:ln>
-        </p:spPr>
-        <p:style>
-          <a:lnRef idx="0"/>
-          <a:fillRef idx="0"/>
-          <a:effectRef idx="0"/>
-          <a:fontRef idx="minor"/>
-        </p:style>
-      </p:sp>
-      <p:sp>
-        <p:nvSpPr>
-          <p:cNvPr id="124" name="CustomShape 2"/>
-          <p:cNvSpPr/>
-          <p:nvPr/>
-        </p:nvSpPr>
-        <p:spPr>
-          <a:xfrm>
-            <a:off x="504000" y="1368000"/>
-            <a:ext cx="9070200" cy="3286440"/>
-          </a:xfrm>
-          <a:prstGeom prst="rect">
-            <a:avLst/>
-          </a:prstGeom>
-          <a:noFill/>
-          <a:ln>
-            <a:noFill/>
-          </a:ln>
-        </p:spPr>
-        <p:style>
-          <a:lnRef idx="0"/>
-          <a:fillRef idx="0"/>
-          <a:effectRef idx="0"/>
-          <a:fontRef idx="minor"/>
-        </p:style>
-      </p:sp>
-      <p:sp>
-        <p:nvSpPr>
-          <p:cNvPr id="125" name="CustomShape 3"/>
-          <p:cNvSpPr/>
-          <p:nvPr/>
-        </p:nvSpPr>
-        <p:spPr>
-          <a:xfrm>
-            <a:off x="2140920" y="1093680"/>
-            <a:ext cx="305280" cy="344520"/>
-          </a:xfrm>
-          <a:prstGeom prst="rect">
-            <a:avLst/>
-          </a:prstGeom>
-          <a:noFill/>
-          <a:ln>
-            <a:noFill/>
-          </a:ln>
-        </p:spPr>
-        <p:style>
-          <a:lnRef idx="0"/>
-          <a:fillRef idx="0"/>
-          <a:effectRef idx="0"/>
-          <a:fontRef idx="minor"/>
-        </p:style>
-        <p:txBody>
-          <a:bodyPr lIns="90000" rIns="90000" tIns="45000" bIns="45000"/>
-          <a:p>
-            <a:r>
-              <a:rPr b="0" lang="fr-FR" sz="1800" spc="-1" strike="noStrike">
-                <a:solidFill>
-                  <a:srgbClr val="ffffff"/>
-                </a:solidFill>
-                <a:uFill>
-                  <a:solidFill>
-                    <a:srgbClr val="ffffff"/>
-                  </a:solidFill>
-                </a:uFill>
-                <a:latin typeface="Arial"/>
-                <a:ea typeface="DejaVu Sans"/>
-              </a:rPr>
-              <a:t>1</a:t>
-            </a:r>
-            <a:endParaRPr b="0" lang="fr-FR" sz="1800" spc="-1" strike="noStrike">
-              <a:solidFill>
-                <a:srgbClr val="000000"/>
-              </a:solidFill>
-              <a:uFill>
-                <a:solidFill>
-                  <a:srgbClr val="ffffff"/>
-                </a:solidFill>
-              </a:uFill>
-              <a:latin typeface="Arial"/>
-            </a:endParaRPr>
-          </a:p>
-        </p:txBody>
-      </p:sp>
-      <p:sp>
-        <p:nvSpPr>
-          <p:cNvPr id="126" name="CustomShape 4"/>
-          <p:cNvSpPr/>
-          <p:nvPr/>
-        </p:nvSpPr>
-        <p:spPr>
-          <a:xfrm>
-            <a:off x="1303200" y="3925080"/>
-            <a:ext cx="305280" cy="344520"/>
-          </a:xfrm>
-          <a:prstGeom prst="rect">
-            <a:avLst/>
-          </a:prstGeom>
-          <a:noFill/>
-          <a:ln>
-            <a:noFill/>
-          </a:ln>
-        </p:spPr>
-        <p:style>
-          <a:lnRef idx="0"/>
-          <a:fillRef idx="0"/>
-          <a:effectRef idx="0"/>
-          <a:fontRef idx="minor"/>
-        </p:style>
-        <p:txBody>
-          <a:bodyPr lIns="90000" rIns="90000" tIns="45000" bIns="45000"/>
-          <a:p>
-            <a:r>
-              <a:rPr b="0" lang="fr-FR" sz="1800" spc="-1" strike="noStrike">
-                <a:solidFill>
-                  <a:srgbClr val="ffffff"/>
-                </a:solidFill>
-                <a:uFill>
-                  <a:solidFill>
-                    <a:srgbClr val="ffffff"/>
-                  </a:solidFill>
-                </a:uFill>
-                <a:latin typeface="Arial"/>
-                <a:ea typeface="DejaVu Sans"/>
-              </a:rPr>
-              <a:t>2</a:t>
-            </a:r>
-            <a:endParaRPr b="0" lang="fr-FR" sz="1800" spc="-1" strike="noStrike">
-              <a:solidFill>
-                <a:srgbClr val="000000"/>
-              </a:solidFill>
-              <a:uFill>
-                <a:solidFill>
-                  <a:srgbClr val="ffffff"/>
-                </a:solidFill>
-              </a:uFill>
-              <a:latin typeface="Arial"/>
-            </a:endParaRPr>
-          </a:p>
-        </p:txBody>
-      </p:sp>
-      <p:sp>
-        <p:nvSpPr>
-          <p:cNvPr id="127" name="CustomShape 5"/>
-          <p:cNvSpPr/>
-          <p:nvPr/>
-        </p:nvSpPr>
-        <p:spPr>
-          <a:xfrm>
-            <a:off x="5544000" y="4896000"/>
-            <a:ext cx="305280" cy="344520"/>
-          </a:xfrm>
-          <a:prstGeom prst="rect">
-            <a:avLst/>
-          </a:prstGeom>
-          <a:noFill/>
-          <a:ln>
-            <a:noFill/>
-          </a:ln>
-        </p:spPr>
-        <p:style>
-          <a:lnRef idx="0"/>
-          <a:fillRef idx="0"/>
-          <a:effectRef idx="0"/>
-          <a:fontRef idx="minor"/>
-        </p:style>
-        <p:txBody>
-          <a:bodyPr lIns="90000" rIns="90000" tIns="45000" bIns="45000"/>
-          <a:p>
-            <a:r>
-              <a:rPr b="0" lang="fr-FR" sz="1800" spc="-1" strike="noStrike">
-                <a:solidFill>
-                  <a:srgbClr val="ffffff"/>
-                </a:solidFill>
-                <a:uFill>
-                  <a:solidFill>
-                    <a:srgbClr val="ffffff"/>
-                  </a:solidFill>
-                </a:uFill>
-                <a:latin typeface="Arial"/>
-                <a:ea typeface="DejaVu Sans"/>
-              </a:rPr>
-              <a:t>3</a:t>
-            </a:r>
-            <a:endParaRPr b="0" lang="fr-FR" sz="1800" spc="-1" strike="noStrike">
-              <a:solidFill>
-                <a:srgbClr val="000000"/>
-              </a:solidFill>
-              <a:uFill>
-                <a:solidFill>
-                  <a:srgbClr val="ffffff"/>
-                </a:solidFill>
-              </a:uFill>
-              <a:latin typeface="Arial"/>
-            </a:endParaRPr>
-          </a:p>
-        </p:txBody>
-      </p:sp>
       <p:pic>
         <p:nvPicPr>
-          <p:cNvPr id="128" name="" descr=""/>
+          <p:cNvPr id="162" name="" descr=""/>
           <p:cNvPicPr/>
           <p:nvPr/>
         </p:nvPicPr>
@@ -7948,8 +9759,8 @@
         </p:blipFill>
         <p:spPr>
           <a:xfrm>
-            <a:off x="21600" y="227880"/>
-            <a:ext cx="5090400" cy="5172120"/>
+            <a:off x="5044680" y="216000"/>
+            <a:ext cx="4999320" cy="5220000"/>
           </a:xfrm>
           <a:prstGeom prst="rect">
             <a:avLst/>
@@ -7961,7 +9772,7 @@
       </p:pic>
       <p:pic>
         <p:nvPicPr>
-          <p:cNvPr id="129" name="" descr=""/>
+          <p:cNvPr id="163" name="" descr=""/>
           <p:cNvPicPr/>
           <p:nvPr/>
         </p:nvPicPr>
@@ -7971,8 +9782,8 @@
         </p:blipFill>
         <p:spPr>
           <a:xfrm>
-            <a:off x="5141520" y="252000"/>
-            <a:ext cx="4939200" cy="5112000"/>
+            <a:off x="30960" y="216000"/>
+            <a:ext cx="5038560" cy="5229360"/>
           </a:xfrm>
           <a:prstGeom prst="rect">
             <a:avLst/>
@@ -7984,20 +9795,72 @@
       </p:pic>
       <p:sp>
         <p:nvSpPr>
-          <p:cNvPr id="130" name="CustomShape 6"/>
+          <p:cNvPr id="164" name="CustomShape 1"/>
           <p:cNvSpPr/>
           <p:nvPr/>
         </p:nvSpPr>
         <p:spPr>
           <a:xfrm>
+            <a:off x="504000" y="216000"/>
+            <a:ext cx="7017840" cy="933840"/>
+          </a:xfrm>
+          <a:prstGeom prst="rect">
+            <a:avLst/>
+          </a:prstGeom>
+          <a:noFill/>
+          <a:ln>
+            <a:noFill/>
+          </a:ln>
+        </p:spPr>
+        <p:style>
+          <a:lnRef idx="0"/>
+          <a:fillRef idx="0"/>
+          <a:effectRef idx="0"/>
+          <a:fontRef idx="minor"/>
+        </p:style>
+      </p:sp>
+      <p:sp>
+        <p:nvSpPr>
+          <p:cNvPr id="165" name="CustomShape 2"/>
+          <p:cNvSpPr/>
+          <p:nvPr/>
+        </p:nvSpPr>
+        <p:spPr>
+          <a:xfrm>
+            <a:off x="504000" y="1368000"/>
+            <a:ext cx="9069840" cy="3286080"/>
+          </a:xfrm>
+          <a:prstGeom prst="rect">
+            <a:avLst/>
+          </a:prstGeom>
+          <a:noFill/>
+          <a:ln>
+            <a:noFill/>
+          </a:ln>
+        </p:spPr>
+        <p:style>
+          <a:lnRef idx="0"/>
+          <a:fillRef idx="0"/>
+          <a:effectRef idx="0"/>
+          <a:fontRef idx="minor"/>
+        </p:style>
+      </p:sp>
+      <p:sp>
+        <p:nvSpPr>
+          <p:cNvPr id="166" name="CustomShape 3"/>
+          <p:cNvSpPr/>
+          <p:nvPr/>
+        </p:nvSpPr>
+        <p:spPr>
+          <a:xfrm>
             <a:off x="4320000" y="1224000"/>
-            <a:ext cx="360000" cy="144000"/>
+            <a:ext cx="359640" cy="143640"/>
           </a:xfrm>
           <a:custGeom>
             <a:avLst/>
             <a:gdLst/>
             <a:ahLst/>
-            <a:rect l="0" t="0" r="r" b="b"/>
+            <a:rect l="l" t="t" r="r" b="b"/>
             <a:pathLst>
               <a:path w="1002" h="402">
                 <a:moveTo>
@@ -8045,14 +9908,14 @@
       </p:sp>
       <p:sp>
         <p:nvSpPr>
-          <p:cNvPr id="131" name="TextShape 7"/>
-          <p:cNvSpPr txBox="1"/>
+          <p:cNvPr id="167" name="CustomShape 4"/>
+          <p:cNvSpPr/>
           <p:nvPr/>
         </p:nvSpPr>
         <p:spPr>
           <a:xfrm>
             <a:off x="4644000" y="1114200"/>
-            <a:ext cx="288000" cy="346320"/>
+            <a:ext cx="287640" cy="345960"/>
           </a:xfrm>
           <a:prstGeom prst="rect">
             <a:avLst/>
@@ -8062,6 +9925,12 @@
             <a:noFill/>
           </a:ln>
         </p:spPr>
+        <p:style>
+          <a:lnRef idx="0"/>
+          <a:fillRef idx="0"/>
+          <a:effectRef idx="0"/>
+          <a:fontRef idx="minor"/>
+        </p:style>
         <p:txBody>
           <a:bodyPr lIns="90000" rIns="90000" tIns="45000" bIns="45000"/>
           <a:p>
@@ -8081,28 +9950,28 @@
             </a:r>
             <a:endParaRPr b="0" lang="fr-FR" sz="1800" spc="-1" strike="noStrike">
               <a:solidFill>
-                <a:srgbClr val="007fff"/>
-              </a:solidFill>
-              <a:uFill>
-                <a:solidFill>
-                  <a:srgbClr val="ffffff"/>
-                </a:solidFill>
-              </a:uFill>
-              <a:latin typeface="Arial"/>
-            </a:endParaRPr>
-          </a:p>
-        </p:txBody>
-      </p:sp>
-      <p:sp>
-        <p:nvSpPr>
-          <p:cNvPr id="132" name="TextShape 8"/>
-          <p:cNvSpPr txBox="1"/>
+                <a:srgbClr val="000000"/>
+              </a:solidFill>
+              <a:uFill>
+                <a:solidFill>
+                  <a:srgbClr val="ffffff"/>
+                </a:solidFill>
+              </a:uFill>
+              <a:latin typeface="Arial"/>
+            </a:endParaRPr>
+          </a:p>
+        </p:txBody>
+      </p:sp>
+      <p:sp>
+        <p:nvSpPr>
+          <p:cNvPr id="168" name="CustomShape 5"/>
+          <p:cNvSpPr/>
           <p:nvPr/>
         </p:nvSpPr>
         <p:spPr>
           <a:xfrm>
             <a:off x="4248000" y="2880000"/>
-            <a:ext cx="288000" cy="346320"/>
+            <a:ext cx="287640" cy="345960"/>
           </a:xfrm>
           <a:prstGeom prst="rect">
             <a:avLst/>
@@ -8112,6 +9981,12 @@
             <a:noFill/>
           </a:ln>
         </p:spPr>
+        <p:style>
+          <a:lnRef idx="0"/>
+          <a:fillRef idx="0"/>
+          <a:effectRef idx="0"/>
+          <a:fontRef idx="minor"/>
+        </p:style>
         <p:txBody>
           <a:bodyPr lIns="90000" rIns="90000" tIns="45000" bIns="45000"/>
           <a:p>
@@ -8131,28 +10006,28 @@
             </a:r>
             <a:endParaRPr b="0" lang="fr-FR" sz="1800" spc="-1" strike="noStrike">
               <a:solidFill>
-                <a:srgbClr val="007fff"/>
-              </a:solidFill>
-              <a:uFill>
-                <a:solidFill>
-                  <a:srgbClr val="ffffff"/>
-                </a:solidFill>
-              </a:uFill>
-              <a:latin typeface="Arial"/>
-            </a:endParaRPr>
-          </a:p>
-        </p:txBody>
-      </p:sp>
-      <p:sp>
-        <p:nvSpPr>
-          <p:cNvPr id="133" name="TextShape 9"/>
-          <p:cNvSpPr txBox="1"/>
+                <a:srgbClr val="000000"/>
+              </a:solidFill>
+              <a:uFill>
+                <a:solidFill>
+                  <a:srgbClr val="ffffff"/>
+                </a:solidFill>
+              </a:uFill>
+              <a:latin typeface="Arial"/>
+            </a:endParaRPr>
+          </a:p>
+        </p:txBody>
+      </p:sp>
+      <p:sp>
+        <p:nvSpPr>
+          <p:cNvPr id="169" name="CustomShape 6"/>
+          <p:cNvSpPr/>
           <p:nvPr/>
         </p:nvSpPr>
         <p:spPr>
           <a:xfrm>
-            <a:off x="8856000" y="3564000"/>
-            <a:ext cx="288000" cy="346320"/>
+            <a:off x="8820000" y="4344120"/>
+            <a:ext cx="287640" cy="345960"/>
           </a:xfrm>
           <a:prstGeom prst="rect">
             <a:avLst/>
@@ -8162,6 +10037,12 @@
             <a:noFill/>
           </a:ln>
         </p:spPr>
+        <p:style>
+          <a:lnRef idx="0"/>
+          <a:fillRef idx="0"/>
+          <a:effectRef idx="0"/>
+          <a:fontRef idx="minor"/>
+        </p:style>
         <p:txBody>
           <a:bodyPr lIns="90000" rIns="90000" tIns="45000" bIns="45000"/>
           <a:p>
@@ -8181,34 +10062,34 @@
             </a:r>
             <a:endParaRPr b="0" lang="fr-FR" sz="1800" spc="-1" strike="noStrike">
               <a:solidFill>
-                <a:srgbClr val="007fff"/>
-              </a:solidFill>
-              <a:uFill>
-                <a:solidFill>
-                  <a:srgbClr val="ffffff"/>
-                </a:solidFill>
-              </a:uFill>
-              <a:latin typeface="Arial"/>
-            </a:endParaRPr>
-          </a:p>
-        </p:txBody>
-      </p:sp>
-      <p:sp>
-        <p:nvSpPr>
-          <p:cNvPr id="134" name="CustomShape 10"/>
+                <a:srgbClr val="000000"/>
+              </a:solidFill>
+              <a:uFill>
+                <a:solidFill>
+                  <a:srgbClr val="ffffff"/>
+                </a:solidFill>
+              </a:uFill>
+              <a:latin typeface="Arial"/>
+            </a:endParaRPr>
+          </a:p>
+        </p:txBody>
+      </p:sp>
+      <p:sp>
+        <p:nvSpPr>
+          <p:cNvPr id="170" name="CustomShape 7"/>
           <p:cNvSpPr/>
           <p:nvPr/>
         </p:nvSpPr>
         <p:spPr>
           <a:xfrm>
-            <a:off x="8496000" y="3672000"/>
-            <a:ext cx="360000" cy="144000"/>
+            <a:off x="8423640" y="4467600"/>
+            <a:ext cx="359640" cy="143640"/>
           </a:xfrm>
           <a:custGeom>
             <a:avLst/>
             <a:gdLst/>
             <a:ahLst/>
-            <a:rect l="0" t="0" r="r" b="b"/>
+            <a:rect l="l" t="t" r="r" b="b"/>
             <a:pathLst>
               <a:path w="1002" h="402">
                 <a:moveTo>
@@ -8290,7 +10171,7 @@
                                           </p:stCondLst>
                                         </p:cTn>
                                         <p:tgtEl>
-                                          <p:spTgt spid="131">
+                                          <p:spTgt spid="167">
                                             <p:txEl>
                                               <p:pRg st="0" end="2"/>
                                             </p:txEl>
@@ -8339,7 +10220,7 @@
                                           </p:stCondLst>
                                         </p:cTn>
                                         <p:tgtEl>
-                                          <p:spTgt spid="130"/>
+                                          <p:spTgt spid="166"/>
                                         </p:tgtEl>
                                         <p:attrNameLst>
                                           <p:attrName>style.visibility</p:attrName>
@@ -8384,7 +10265,7 @@
                                           </p:stCondLst>
                                         </p:cTn>
                                         <p:tgtEl>
-                                          <p:spTgt spid="132">
+                                          <p:spTgt spid="168">
                                             <p:txEl>
                                               <p:pRg st="0" end="2"/>
                                             </p:txEl>
@@ -8433,7 +10314,7 @@
                                           </p:stCondLst>
                                         </p:cTn>
                                         <p:tgtEl>
-                                          <p:spTgt spid="133">
+                                          <p:spTgt spid="169">
                                             <p:txEl>
                                               <p:pRg st="0" end="2"/>
                                             </p:txEl>
@@ -8482,7 +10363,7 @@
                                           </p:stCondLst>
                                         </p:cTn>
                                         <p:tgtEl>
-                                          <p:spTgt spid="134"/>
+                                          <p:spTgt spid="170"/>
                                         </p:tgtEl>
                                         <p:attrNameLst>
                                           <p:attrName>style.visibility</p:attrName>
@@ -8545,14 +10426,14 @@
       </p:grpSpPr>
       <p:sp>
         <p:nvSpPr>
-          <p:cNvPr id="135" name="CustomShape 1"/>
+          <p:cNvPr id="171" name="CustomShape 1"/>
           <p:cNvSpPr/>
           <p:nvPr/>
         </p:nvSpPr>
         <p:spPr>
           <a:xfrm>
             <a:off x="504000" y="216000"/>
-            <a:ext cx="7018200" cy="934200"/>
+            <a:ext cx="7017840" cy="933840"/>
           </a:xfrm>
           <a:prstGeom prst="rect">
             <a:avLst/>
@@ -8602,14 +10483,14 @@
       </p:sp>
       <p:sp>
         <p:nvSpPr>
-          <p:cNvPr id="136" name="CustomShape 2"/>
+          <p:cNvPr id="172" name="CustomShape 2"/>
           <p:cNvSpPr/>
           <p:nvPr/>
         </p:nvSpPr>
         <p:spPr>
           <a:xfrm>
             <a:off x="516240" y="1728000"/>
-            <a:ext cx="9070200" cy="3286440"/>
+            <a:ext cx="9069840" cy="3286080"/>
           </a:xfrm>
           <a:prstGeom prst="rect">
             <a:avLst/>
@@ -8630,7 +10511,7 @@
             <a:normAutofit/>
           </a:bodyPr>
           <a:p>
-            <a:pPr marL="432000" indent="-322200" algn="just">
+            <a:pPr marL="432000" indent="-321840" algn="just">
               <a:lnSpc>
                 <a:spcPct val="100000"/>
               </a:lnSpc>
@@ -8672,7 +10553,7 @@
             </a:endParaRPr>
           </a:p>
           <a:p>
-            <a:pPr lvl="1" marL="432000" indent="-216000" algn="just">
+            <a:pPr lvl="1" marL="432000" indent="-215640" algn="just">
               <a:lnSpc>
                 <a:spcPct val="100000"/>
               </a:lnSpc>
@@ -8714,7 +10595,7 @@
             </a:endParaRPr>
           </a:p>
           <a:p>
-            <a:pPr lvl="1" marL="432000" indent="-216000" algn="just">
+            <a:pPr lvl="1" marL="432000" indent="-215640" algn="just">
               <a:lnSpc>
                 <a:spcPct val="100000"/>
               </a:lnSpc>
@@ -8741,7 +10622,7 @@
                 <a:latin typeface="Arial"/>
                 <a:ea typeface="DejaVu Sans"/>
               </a:rPr>
-              <a:t>Puis remplissage des tables en fonction des informations des produits (2).</a:t>
+              <a:t>Puis remplissage des tables en fonction des informations des produits (2 et 2bis).</a:t>
             </a:r>
             <a:endParaRPr b="0" lang="fr-FR" sz="2200" spc="-1" strike="noStrike">
               <a:solidFill>
@@ -8756,19 +10637,13 @@
             </a:endParaRPr>
           </a:p>
           <a:p>
-            <a:pPr lvl="1" marL="864000" indent="-322200" algn="just">
+            <a:pPr algn="just">
               <a:lnSpc>
                 <a:spcPct val="100000"/>
               </a:lnSpc>
               <a:spcAft>
                 <a:spcPts val="918"/>
               </a:spcAft>
-              <a:buClr>
-                <a:srgbClr val="000000"/>
-              </a:buClr>
-              <a:buSzPct val="75000"/>
-              <a:buFont typeface="Symbol"/>
-              <a:buChar char=""/>
             </a:pPr>
             <a:endParaRPr b="0" lang="fr-FR" sz="2200" spc="-1" strike="noStrike">
               <a:solidFill>
@@ -8833,175 +10708,9 @@
           <a:chExt cx="0" cy="0"/>
         </a:xfrm>
       </p:grpSpPr>
-      <p:sp>
-        <p:nvSpPr>
-          <p:cNvPr id="137" name="CustomShape 1"/>
-          <p:cNvSpPr/>
-          <p:nvPr/>
-        </p:nvSpPr>
-        <p:spPr>
-          <a:xfrm>
-            <a:off x="504000" y="216000"/>
-            <a:ext cx="7018200" cy="934200"/>
-          </a:xfrm>
-          <a:prstGeom prst="rect">
-            <a:avLst/>
-          </a:prstGeom>
-          <a:noFill/>
-          <a:ln>
-            <a:noFill/>
-          </a:ln>
-        </p:spPr>
-        <p:style>
-          <a:lnRef idx="0"/>
-          <a:fillRef idx="0"/>
-          <a:effectRef idx="0"/>
-          <a:fontRef idx="minor"/>
-        </p:style>
-      </p:sp>
-      <p:sp>
-        <p:nvSpPr>
-          <p:cNvPr id="138" name="CustomShape 2"/>
-          <p:cNvSpPr/>
-          <p:nvPr/>
-        </p:nvSpPr>
-        <p:spPr>
-          <a:xfrm>
-            <a:off x="504000" y="1368000"/>
-            <a:ext cx="9070200" cy="3286440"/>
-          </a:xfrm>
-          <a:prstGeom prst="rect">
-            <a:avLst/>
-          </a:prstGeom>
-          <a:noFill/>
-          <a:ln>
-            <a:noFill/>
-          </a:ln>
-        </p:spPr>
-        <p:style>
-          <a:lnRef idx="0"/>
-          <a:fillRef idx="0"/>
-          <a:effectRef idx="0"/>
-          <a:fontRef idx="minor"/>
-        </p:style>
-      </p:sp>
-      <p:sp>
-        <p:nvSpPr>
-          <p:cNvPr id="139" name="CustomShape 3"/>
-          <p:cNvSpPr/>
-          <p:nvPr/>
-        </p:nvSpPr>
-        <p:spPr>
-          <a:xfrm>
-            <a:off x="1961640" y="3461400"/>
-            <a:ext cx="486000" cy="344520"/>
-          </a:xfrm>
-          <a:prstGeom prst="rect">
-            <a:avLst/>
-          </a:prstGeom>
-          <a:noFill/>
-          <a:ln>
-            <a:noFill/>
-          </a:ln>
-        </p:spPr>
-        <p:style>
-          <a:lnRef idx="0"/>
-          <a:fillRef idx="0"/>
-          <a:effectRef idx="0"/>
-          <a:fontRef idx="minor"/>
-        </p:style>
-        <p:txBody>
-          <a:bodyPr lIns="90000" rIns="90000" tIns="45000" bIns="45000"/>
-          <a:p>
-            <a:r>
-              <a:rPr b="0" lang="fr-FR" sz="1800" spc="-1" strike="noStrike">
-                <a:solidFill>
-                  <a:srgbClr val="ffffff"/>
-                </a:solidFill>
-                <a:uFill>
-                  <a:solidFill>
-                    <a:srgbClr val="ffffff"/>
-                  </a:solidFill>
-                </a:uFill>
-                <a:latin typeface="Arial"/>
-                <a:ea typeface="DejaVu Sans"/>
-              </a:rPr>
-              <a:t>1)</a:t>
-            </a:r>
-            <a:endParaRPr b="0" lang="fr-FR" sz="1800" spc="-1" strike="noStrike">
-              <a:solidFill>
-                <a:srgbClr val="000000"/>
-              </a:solidFill>
-              <a:uFill>
-                <a:solidFill>
-                  <a:srgbClr val="ffffff"/>
-                </a:solidFill>
-              </a:uFill>
-              <a:latin typeface="Arial"/>
-            </a:endParaRPr>
-          </a:p>
-        </p:txBody>
-      </p:sp>
-      <p:sp>
-        <p:nvSpPr>
-          <p:cNvPr id="140" name="CustomShape 4"/>
-          <p:cNvSpPr/>
-          <p:nvPr/>
-        </p:nvSpPr>
-        <p:spPr>
-          <a:xfrm>
-            <a:off x="1993680" y="4766760"/>
-            <a:ext cx="525960" cy="344520"/>
-          </a:xfrm>
-          <a:prstGeom prst="rect">
-            <a:avLst/>
-          </a:prstGeom>
-          <a:noFill/>
-          <a:ln>
-            <a:noFill/>
-          </a:ln>
-        </p:spPr>
-        <p:style>
-          <a:lnRef idx="0"/>
-          <a:fillRef idx="0"/>
-          <a:effectRef idx="0"/>
-          <a:fontRef idx="minor"/>
-        </p:style>
-        <p:txBody>
-          <a:bodyPr lIns="90000" rIns="90000" tIns="45000" bIns="45000"/>
-          <a:p>
-            <a:r>
-              <a:rPr b="0" lang="fr-FR" sz="1800" spc="-1" strike="noStrike">
-                <a:solidFill>
-                  <a:srgbClr val="ffffff"/>
-                </a:solidFill>
-                <a:uFill>
-                  <a:solidFill>
-                    <a:srgbClr val="ffffff"/>
-                  </a:solidFill>
-                </a:uFill>
-                <a:latin typeface="Arial"/>
-                <a:ea typeface="DejaVu Sans"/>
-              </a:rPr>
-              <a:t>2)</a:t>
-            </a:r>
-            <a:endParaRPr b="0" lang="fr-FR" sz="1800" spc="-1" strike="noStrike">
-              <a:solidFill>
-                <a:srgbClr val="000000"/>
-              </a:solidFill>
-              <a:uFill>
-                <a:solidFill>
-                  <a:srgbClr val="ffffff"/>
-                </a:solidFill>
-              </a:uFill>
-              <a:latin typeface="Arial"/>
-            </a:endParaRPr>
-          </a:p>
-        </p:txBody>
-      </p:sp>
       <p:pic>
         <p:nvPicPr>
-          <p:cNvPr id="141" name="" descr=""/>
+          <p:cNvPr id="173" name="" descr=""/>
           <p:cNvPicPr/>
           <p:nvPr/>
         </p:nvPicPr>
@@ -9011,8 +10720,8 @@
         </p:blipFill>
         <p:spPr>
           <a:xfrm>
-            <a:off x="36000" y="244080"/>
-            <a:ext cx="4788000" cy="5135760"/>
+            <a:off x="4828320" y="72000"/>
+            <a:ext cx="4819680" cy="5353200"/>
           </a:xfrm>
           <a:prstGeom prst="rect">
             <a:avLst/>
@@ -9024,7 +10733,7 @@
       </p:pic>
       <p:pic>
         <p:nvPicPr>
-          <p:cNvPr id="142" name="" descr=""/>
+          <p:cNvPr id="174" name="" descr=""/>
           <p:cNvPicPr/>
           <p:nvPr/>
         </p:nvPicPr>
@@ -9034,8 +10743,8 @@
         </p:blipFill>
         <p:spPr>
           <a:xfrm>
-            <a:off x="4860000" y="274680"/>
-            <a:ext cx="5184720" cy="5053320"/>
+            <a:off x="194760" y="226800"/>
+            <a:ext cx="4629240" cy="5101200"/>
           </a:xfrm>
           <a:prstGeom prst="rect">
             <a:avLst/>
@@ -9047,14 +10756,14 @@
       </p:pic>
       <p:sp>
         <p:nvSpPr>
-          <p:cNvPr id="143" name="TextShape 5"/>
-          <p:cNvSpPr txBox="1"/>
+          <p:cNvPr id="175" name="CustomShape 1"/>
+          <p:cNvSpPr/>
           <p:nvPr/>
         </p:nvSpPr>
         <p:spPr>
           <a:xfrm>
-            <a:off x="288000" y="2088000"/>
-            <a:ext cx="288000" cy="346320"/>
+            <a:off x="504000" y="216000"/>
+            <a:ext cx="7017840" cy="933840"/>
           </a:xfrm>
           <a:prstGeom prst="rect">
             <a:avLst/>
@@ -9064,6 +10773,64 @@
             <a:noFill/>
           </a:ln>
         </p:spPr>
+        <p:style>
+          <a:lnRef idx="0"/>
+          <a:fillRef idx="0"/>
+          <a:effectRef idx="0"/>
+          <a:fontRef idx="minor"/>
+        </p:style>
+      </p:sp>
+      <p:sp>
+        <p:nvSpPr>
+          <p:cNvPr id="176" name="CustomShape 2"/>
+          <p:cNvSpPr/>
+          <p:nvPr/>
+        </p:nvSpPr>
+        <p:spPr>
+          <a:xfrm>
+            <a:off x="504000" y="1368000"/>
+            <a:ext cx="9069840" cy="3286080"/>
+          </a:xfrm>
+          <a:prstGeom prst="rect">
+            <a:avLst/>
+          </a:prstGeom>
+          <a:noFill/>
+          <a:ln>
+            <a:noFill/>
+          </a:ln>
+        </p:spPr>
+        <p:style>
+          <a:lnRef idx="0"/>
+          <a:fillRef idx="0"/>
+          <a:effectRef idx="0"/>
+          <a:fontRef idx="minor"/>
+        </p:style>
+      </p:sp>
+      <p:sp>
+        <p:nvSpPr>
+          <p:cNvPr id="177" name="CustomShape 3"/>
+          <p:cNvSpPr/>
+          <p:nvPr/>
+        </p:nvSpPr>
+        <p:spPr>
+          <a:xfrm>
+            <a:off x="288000" y="2088000"/>
+            <a:ext cx="287640" cy="345960"/>
+          </a:xfrm>
+          <a:prstGeom prst="rect">
+            <a:avLst/>
+          </a:prstGeom>
+          <a:noFill/>
+          <a:ln>
+            <a:noFill/>
+          </a:ln>
+        </p:spPr>
+        <p:style>
+          <a:lnRef idx="0"/>
+          <a:fillRef idx="0"/>
+          <a:effectRef idx="0"/>
+          <a:fontRef idx="minor"/>
+        </p:style>
         <p:txBody>
           <a:bodyPr lIns="90000" rIns="90000" tIns="45000" bIns="45000"/>
           <a:p>
@@ -9083,28 +10850,28 @@
             </a:r>
             <a:endParaRPr b="0" lang="fr-FR" sz="1800" spc="-1" strike="noStrike">
               <a:solidFill>
-                <a:srgbClr val="007fff"/>
-              </a:solidFill>
-              <a:uFill>
-                <a:solidFill>
-                  <a:srgbClr val="ffffff"/>
-                </a:solidFill>
-              </a:uFill>
-              <a:latin typeface="Arial"/>
-            </a:endParaRPr>
-          </a:p>
-        </p:txBody>
-      </p:sp>
-      <p:sp>
-        <p:nvSpPr>
-          <p:cNvPr id="144" name="TextShape 6"/>
-          <p:cNvSpPr txBox="1"/>
+                <a:srgbClr val="000000"/>
+              </a:solidFill>
+              <a:uFill>
+                <a:solidFill>
+                  <a:srgbClr val="ffffff"/>
+                </a:solidFill>
+              </a:uFill>
+              <a:latin typeface="Arial"/>
+            </a:endParaRPr>
+          </a:p>
+        </p:txBody>
+      </p:sp>
+      <p:sp>
+        <p:nvSpPr>
+          <p:cNvPr id="178" name="CustomShape 4"/>
+          <p:cNvSpPr/>
           <p:nvPr/>
         </p:nvSpPr>
         <p:spPr>
           <a:xfrm>
             <a:off x="9000000" y="3397680"/>
-            <a:ext cx="288000" cy="346320"/>
+            <a:ext cx="287640" cy="345960"/>
           </a:xfrm>
           <a:prstGeom prst="rect">
             <a:avLst/>
@@ -9114,6 +10881,12 @@
             <a:noFill/>
           </a:ln>
         </p:spPr>
+        <p:style>
+          <a:lnRef idx="0"/>
+          <a:fillRef idx="0"/>
+          <a:effectRef idx="0"/>
+          <a:fontRef idx="minor"/>
+        </p:style>
         <p:txBody>
           <a:bodyPr lIns="90000" rIns="90000" tIns="45000" bIns="45000"/>
           <a:p>
@@ -9133,7 +10906,7 @@
             </a:r>
             <a:endParaRPr b="0" lang="fr-FR" sz="1800" spc="-1" strike="noStrike">
               <a:solidFill>
-                <a:srgbClr val="007fff"/>
+                <a:srgbClr val="000000"/>
               </a:solidFill>
               <a:uFill>
                 <a:solidFill>
@@ -9196,14 +10969,14 @@
       </p:grpSpPr>
       <p:sp>
         <p:nvSpPr>
-          <p:cNvPr id="145" name="CustomShape 1"/>
+          <p:cNvPr id="179" name="CustomShape 1"/>
           <p:cNvSpPr/>
           <p:nvPr/>
         </p:nvSpPr>
         <p:spPr>
           <a:xfrm>
             <a:off x="504000" y="216000"/>
-            <a:ext cx="7018200" cy="934200"/>
+            <a:ext cx="7017840" cy="933840"/>
           </a:xfrm>
           <a:prstGeom prst="rect">
             <a:avLst/>
@@ -9222,14 +10995,14 @@
       </p:sp>
       <p:sp>
         <p:nvSpPr>
-          <p:cNvPr id="146" name="CustomShape 2"/>
+          <p:cNvPr id="180" name="CustomShape 2"/>
           <p:cNvSpPr/>
           <p:nvPr/>
         </p:nvSpPr>
         <p:spPr>
           <a:xfrm>
             <a:off x="504000" y="1656000"/>
-            <a:ext cx="9070200" cy="3286440"/>
+            <a:ext cx="9069840" cy="3286080"/>
           </a:xfrm>
           <a:prstGeom prst="rect">
             <a:avLst/>
@@ -9248,7 +11021,7 @@
       </p:sp>
       <p:pic>
         <p:nvPicPr>
-          <p:cNvPr id="147" name="" descr=""/>
+          <p:cNvPr id="181" name="" descr=""/>
           <p:cNvPicPr/>
           <p:nvPr/>
         </p:nvPicPr>
@@ -9258,8 +11031,8 @@
         </p:blipFill>
         <p:spPr>
           <a:xfrm>
-            <a:off x="2601720" y="89280"/>
-            <a:ext cx="5390280" cy="5140080"/>
+            <a:off x="2592360" y="211680"/>
+            <a:ext cx="4943520" cy="5267160"/>
           </a:xfrm>
           <a:prstGeom prst="rect">
             <a:avLst/>
@@ -9271,14 +11044,14 @@
       </p:pic>
       <p:sp>
         <p:nvSpPr>
-          <p:cNvPr id="148" name="TextShape 3"/>
-          <p:cNvSpPr txBox="1"/>
+          <p:cNvPr id="182" name="CustomShape 3"/>
+          <p:cNvSpPr/>
           <p:nvPr/>
         </p:nvSpPr>
         <p:spPr>
           <a:xfrm>
             <a:off x="6768000" y="2520000"/>
-            <a:ext cx="864000" cy="346320"/>
+            <a:ext cx="863640" cy="345960"/>
           </a:xfrm>
           <a:prstGeom prst="rect">
             <a:avLst/>
@@ -9288,6 +11061,12 @@
             <a:noFill/>
           </a:ln>
         </p:spPr>
+        <p:style>
+          <a:lnRef idx="0"/>
+          <a:fillRef idx="0"/>
+          <a:effectRef idx="0"/>
+          <a:fontRef idx="minor"/>
+        </p:style>
         <p:txBody>
           <a:bodyPr lIns="90000" rIns="90000" tIns="45000" bIns="45000"/>
           <a:p>
@@ -9307,7 +11086,7 @@
             </a:r>
             <a:endParaRPr b="0" lang="fr-FR" sz="1800" spc="-1" strike="noStrike">
               <a:solidFill>
-                <a:srgbClr val="007fff"/>
+                <a:srgbClr val="000000"/>
               </a:solidFill>
               <a:uFill>
                 <a:solidFill>
@@ -9370,14 +11149,14 @@
       </p:grpSpPr>
       <p:sp>
         <p:nvSpPr>
-          <p:cNvPr id="149" name="CustomShape 1"/>
+          <p:cNvPr id="183" name="CustomShape 1"/>
           <p:cNvSpPr/>
           <p:nvPr/>
         </p:nvSpPr>
         <p:spPr>
           <a:xfrm>
             <a:off x="504000" y="216000"/>
-            <a:ext cx="7018200" cy="934200"/>
+            <a:ext cx="7017840" cy="933840"/>
           </a:xfrm>
           <a:prstGeom prst="rect">
             <a:avLst/>
@@ -9427,14 +11206,14 @@
       </p:sp>
       <p:sp>
         <p:nvSpPr>
-          <p:cNvPr id="150" name="CustomShape 2"/>
+          <p:cNvPr id="184" name="CustomShape 2"/>
           <p:cNvSpPr/>
           <p:nvPr/>
         </p:nvSpPr>
         <p:spPr>
           <a:xfrm>
             <a:off x="504000" y="1656000"/>
-            <a:ext cx="9070200" cy="3286440"/>
+            <a:ext cx="9069840" cy="3286080"/>
           </a:xfrm>
           <a:prstGeom prst="rect">
             <a:avLst/>
@@ -9455,7 +11234,7 @@
             <a:normAutofit/>
           </a:bodyPr>
           <a:p>
-            <a:pPr marL="432000" indent="-322200" algn="just">
+            <a:pPr marL="432000" indent="-321840" algn="just">
               <a:lnSpc>
                 <a:spcPct val="100000"/>
               </a:lnSpc>
@@ -9497,7 +11276,7 @@
             </a:endParaRPr>
           </a:p>
           <a:p>
-            <a:pPr marL="432000" indent="-322200" algn="just">
+            <a:pPr marL="432000" indent="-321840" algn="just">
               <a:lnSpc>
                 <a:spcPct val="100000"/>
               </a:lnSpc>
@@ -9539,7 +11318,7 @@
             </a:endParaRPr>
           </a:p>
           <a:p>
-            <a:pPr marL="432000" indent="-322200" algn="just">
+            <a:pPr marL="432000" indent="-321840" algn="just">
               <a:lnSpc>
                 <a:spcPct val="100000"/>
               </a:lnSpc>
@@ -9581,7 +11360,7 @@
             </a:endParaRPr>
           </a:p>
           <a:p>
-            <a:pPr marL="432000" indent="-322200" algn="just">
+            <a:pPr marL="432000" indent="-321840" algn="just">
               <a:lnSpc>
                 <a:spcPct val="100000"/>
               </a:lnSpc>
@@ -9623,7 +11402,7 @@
             </a:endParaRPr>
           </a:p>
           <a:p>
-            <a:pPr marL="432000" indent="-322200" algn="just">
+            <a:pPr marL="432000" indent="-321840" algn="just">
               <a:lnSpc>
                 <a:spcPct val="100000"/>
               </a:lnSpc>
@@ -9665,19 +11444,13 @@
             </a:endParaRPr>
           </a:p>
           <a:p>
-            <a:pPr lvl="1" marL="432000" indent="-216000" algn="just">
+            <a:pPr algn="just">
               <a:lnSpc>
                 <a:spcPct val="100000"/>
               </a:lnSpc>
               <a:spcAft>
                 <a:spcPts val="1148"/>
               </a:spcAft>
-              <a:buClr>
-                <a:srgbClr val="000000"/>
-              </a:buClr>
-              <a:buSzPct val="45000"/>
-              <a:buFont typeface="Wingdings" charset="2"/>
-              <a:buChar char=""/>
             </a:pPr>
             <a:endParaRPr b="0" lang="fr-FR" sz="2200" spc="-1" strike="noStrike">
               <a:solidFill>
@@ -9742,16 +11515,39 @@
           <a:chExt cx="0" cy="0"/>
         </a:xfrm>
       </p:grpSpPr>
-      <p:sp>
-        <p:nvSpPr>
-          <p:cNvPr id="151" name="CustomShape 1"/>
+      <p:pic>
+        <p:nvPicPr>
+          <p:cNvPr id="185" name="" descr=""/>
+          <p:cNvPicPr/>
+          <p:nvPr/>
+        </p:nvPicPr>
+        <p:blipFill>
+          <a:blip r:embed="rId1"/>
+          <a:stretch/>
+        </p:blipFill>
+        <p:spPr>
+          <a:xfrm>
+            <a:off x="36000" y="1578960"/>
+            <a:ext cx="6165720" cy="3749040"/>
+          </a:xfrm>
+          <a:prstGeom prst="rect">
+            <a:avLst/>
+          </a:prstGeom>
+          <a:ln>
+            <a:noFill/>
+          </a:ln>
+        </p:spPr>
+      </p:pic>
+      <p:sp>
+        <p:nvSpPr>
+          <p:cNvPr id="186" name="CustomShape 1"/>
           <p:cNvSpPr/>
           <p:nvPr/>
         </p:nvSpPr>
         <p:spPr>
           <a:xfrm>
             <a:off x="504000" y="216000"/>
-            <a:ext cx="7018200" cy="934200"/>
+            <a:ext cx="7017840" cy="933840"/>
           </a:xfrm>
           <a:prstGeom prst="rect">
             <a:avLst/>
@@ -9770,14 +11566,14 @@
       </p:sp>
       <p:sp>
         <p:nvSpPr>
-          <p:cNvPr id="152" name="CustomShape 2"/>
+          <p:cNvPr id="187" name="CustomShape 2"/>
           <p:cNvSpPr/>
           <p:nvPr/>
         </p:nvSpPr>
         <p:spPr>
           <a:xfrm>
             <a:off x="504000" y="1368000"/>
-            <a:ext cx="9070200" cy="3286440"/>
+            <a:ext cx="9069840" cy="3286080"/>
           </a:xfrm>
           <a:prstGeom prst="rect">
             <a:avLst/>
@@ -9796,14 +11592,14 @@
       </p:sp>
       <p:sp>
         <p:nvSpPr>
-          <p:cNvPr id="153" name="CustomShape 3"/>
+          <p:cNvPr id="188" name="CustomShape 3"/>
           <p:cNvSpPr/>
           <p:nvPr/>
         </p:nvSpPr>
         <p:spPr>
           <a:xfrm>
-            <a:off x="4702680" y="1273680"/>
-            <a:ext cx="552960" cy="344520"/>
+            <a:off x="504000" y="226080"/>
+            <a:ext cx="9071640" cy="946080"/>
           </a:xfrm>
           <a:prstGeom prst="rect">
             <a:avLst/>
@@ -9819,228 +11615,6 @@
           <a:effectRef idx="0"/>
           <a:fontRef idx="minor"/>
         </p:style>
-        <p:txBody>
-          <a:bodyPr lIns="90000" rIns="90000" tIns="45000" bIns="45000"/>
-          <a:p>
-            <a:r>
-              <a:rPr b="0" lang="fr-FR" sz="1800" spc="-1" strike="noStrike">
-                <a:solidFill>
-                  <a:srgbClr val="ffffff"/>
-                </a:solidFill>
-                <a:uFill>
-                  <a:solidFill>
-                    <a:srgbClr val="ffffff"/>
-                  </a:solidFill>
-                </a:uFill>
-                <a:latin typeface="Arial"/>
-                <a:ea typeface="DejaVu Sans"/>
-              </a:rPr>
-              <a:t>A)</a:t>
-            </a:r>
-            <a:endParaRPr b="0" lang="fr-FR" sz="1800" spc="-1" strike="noStrike">
-              <a:solidFill>
-                <a:srgbClr val="000000"/>
-              </a:solidFill>
-              <a:uFill>
-                <a:solidFill>
-                  <a:srgbClr val="ffffff"/>
-                </a:solidFill>
-              </a:uFill>
-              <a:latin typeface="Arial"/>
-            </a:endParaRPr>
-          </a:p>
-        </p:txBody>
-      </p:sp>
-      <p:sp>
-        <p:nvSpPr>
-          <p:cNvPr id="154" name="CustomShape 4"/>
-          <p:cNvSpPr/>
-          <p:nvPr/>
-        </p:nvSpPr>
-        <p:spPr>
-          <a:xfrm>
-            <a:off x="7488000" y="1453680"/>
-            <a:ext cx="503640" cy="344520"/>
-          </a:xfrm>
-          <a:prstGeom prst="rect">
-            <a:avLst/>
-          </a:prstGeom>
-          <a:noFill/>
-          <a:ln>
-            <a:noFill/>
-          </a:ln>
-        </p:spPr>
-        <p:style>
-          <a:lnRef idx="0"/>
-          <a:fillRef idx="0"/>
-          <a:effectRef idx="0"/>
-          <a:fontRef idx="minor"/>
-        </p:style>
-        <p:txBody>
-          <a:bodyPr lIns="90000" rIns="90000" tIns="45000" bIns="45000"/>
-          <a:p>
-            <a:r>
-              <a:rPr b="0" lang="fr-FR" sz="1800" spc="-1" strike="noStrike">
-                <a:solidFill>
-                  <a:srgbClr val="ffffff"/>
-                </a:solidFill>
-                <a:uFill>
-                  <a:solidFill>
-                    <a:srgbClr val="ffffff"/>
-                  </a:solidFill>
-                </a:uFill>
-                <a:latin typeface="Arial"/>
-                <a:ea typeface="DejaVu Sans"/>
-              </a:rPr>
-              <a:t>B)</a:t>
-            </a:r>
-            <a:endParaRPr b="0" lang="fr-FR" sz="1800" spc="-1" strike="noStrike">
-              <a:solidFill>
-                <a:srgbClr val="000000"/>
-              </a:solidFill>
-              <a:uFill>
-                <a:solidFill>
-                  <a:srgbClr val="ffffff"/>
-                </a:solidFill>
-              </a:uFill>
-              <a:latin typeface="Arial"/>
-            </a:endParaRPr>
-          </a:p>
-        </p:txBody>
-      </p:sp>
-      <p:sp>
-        <p:nvSpPr>
-          <p:cNvPr id="155" name="CustomShape 5"/>
-          <p:cNvSpPr/>
-          <p:nvPr/>
-        </p:nvSpPr>
-        <p:spPr>
-          <a:xfrm>
-            <a:off x="2232000" y="2304000"/>
-            <a:ext cx="553320" cy="344520"/>
-          </a:xfrm>
-          <a:prstGeom prst="rect">
-            <a:avLst/>
-          </a:prstGeom>
-          <a:noFill/>
-          <a:ln>
-            <a:noFill/>
-          </a:ln>
-        </p:spPr>
-        <p:style>
-          <a:lnRef idx="0"/>
-          <a:fillRef idx="0"/>
-          <a:effectRef idx="0"/>
-          <a:fontRef idx="minor"/>
-        </p:style>
-        <p:txBody>
-          <a:bodyPr lIns="90000" rIns="90000" tIns="45000" bIns="45000"/>
-          <a:p>
-            <a:r>
-              <a:rPr b="0" lang="fr-FR" sz="1800" spc="-1" strike="noStrike">
-                <a:solidFill>
-                  <a:srgbClr val="ffffff"/>
-                </a:solidFill>
-                <a:uFill>
-                  <a:solidFill>
-                    <a:srgbClr val="ffffff"/>
-                  </a:solidFill>
-                </a:uFill>
-                <a:latin typeface="Arial"/>
-                <a:ea typeface="DejaVu Sans"/>
-              </a:rPr>
-              <a:t>C)</a:t>
-            </a:r>
-            <a:endParaRPr b="0" lang="fr-FR" sz="1800" spc="-1" strike="noStrike">
-              <a:solidFill>
-                <a:srgbClr val="000000"/>
-              </a:solidFill>
-              <a:uFill>
-                <a:solidFill>
-                  <a:srgbClr val="ffffff"/>
-                </a:solidFill>
-              </a:uFill>
-              <a:latin typeface="Arial"/>
-            </a:endParaRPr>
-          </a:p>
-        </p:txBody>
-      </p:sp>
-      <p:sp>
-        <p:nvSpPr>
-          <p:cNvPr id="156" name="CustomShape 6"/>
-          <p:cNvSpPr/>
-          <p:nvPr/>
-        </p:nvSpPr>
-        <p:spPr>
-          <a:xfrm>
-            <a:off x="6912000" y="2376000"/>
-            <a:ext cx="503640" cy="371880"/>
-          </a:xfrm>
-          <a:prstGeom prst="rect">
-            <a:avLst/>
-          </a:prstGeom>
-          <a:noFill/>
-          <a:ln>
-            <a:noFill/>
-          </a:ln>
-        </p:spPr>
-        <p:style>
-          <a:lnRef idx="0"/>
-          <a:fillRef idx="0"/>
-          <a:effectRef idx="0"/>
-          <a:fontRef idx="minor"/>
-        </p:style>
-        <p:txBody>
-          <a:bodyPr lIns="90000" rIns="90000" tIns="45000" bIns="45000"/>
-          <a:p>
-            <a:r>
-              <a:rPr b="0" lang="fr-FR" sz="1800" spc="-1" strike="noStrike">
-                <a:solidFill>
-                  <a:srgbClr val="ffffff"/>
-                </a:solidFill>
-                <a:uFill>
-                  <a:solidFill>
-                    <a:srgbClr val="ffffff"/>
-                  </a:solidFill>
-                </a:uFill>
-                <a:latin typeface="Arial"/>
-                <a:ea typeface="DejaVu Sans"/>
-              </a:rPr>
-              <a:t>D)</a:t>
-            </a:r>
-            <a:endParaRPr b="0" lang="fr-FR" sz="1800" spc="-1" strike="noStrike">
-              <a:solidFill>
-                <a:srgbClr val="000000"/>
-              </a:solidFill>
-              <a:uFill>
-                <a:solidFill>
-                  <a:srgbClr val="ffffff"/>
-                </a:solidFill>
-              </a:uFill>
-              <a:latin typeface="Arial"/>
-            </a:endParaRPr>
-          </a:p>
-        </p:txBody>
-      </p:sp>
-      <p:sp>
-        <p:nvSpPr>
-          <p:cNvPr id="157" name="TextShape 7"/>
-          <p:cNvSpPr txBox="1"/>
-          <p:nvPr/>
-        </p:nvSpPr>
-        <p:spPr>
-          <a:xfrm>
-            <a:off x="504000" y="226080"/>
-            <a:ext cx="9072000" cy="946440"/>
-          </a:xfrm>
-          <a:prstGeom prst="rect">
-            <a:avLst/>
-          </a:prstGeom>
-          <a:noFill/>
-          <a:ln>
-            <a:noFill/>
-          </a:ln>
-        </p:spPr>
         <p:txBody>
           <a:bodyPr lIns="0" rIns="0" tIns="0" bIns="0" anchor="ctr"/>
           <a:p>
@@ -10074,14 +11648,14 @@
       </p:sp>
       <p:sp>
         <p:nvSpPr>
-          <p:cNvPr id="158" name="TextShape 8"/>
-          <p:cNvSpPr txBox="1"/>
+          <p:cNvPr id="189" name="CustomShape 4"/>
+          <p:cNvSpPr/>
           <p:nvPr/>
         </p:nvSpPr>
         <p:spPr>
           <a:xfrm>
             <a:off x="504000" y="1326600"/>
-            <a:ext cx="9072000" cy="3288600"/>
+            <a:ext cx="9071640" cy="3288240"/>
           </a:xfrm>
           <a:prstGeom prst="rect">
             <a:avLst/>
@@ -10091,58 +11665,23 @@
             <a:noFill/>
           </a:ln>
         </p:spPr>
-        <p:txBody>
-          <a:bodyPr lIns="0" rIns="0" tIns="0" bIns="0">
-            <a:normAutofit/>
-          </a:bodyPr>
-          <a:p>
-            <a:endParaRPr b="0" lang="fr-FR" sz="3200" spc="-1" strike="noStrike">
-              <a:solidFill>
-                <a:srgbClr val="000000"/>
-              </a:solidFill>
-              <a:uFill>
-                <a:solidFill>
-                  <a:srgbClr val="ffffff"/>
-                </a:solidFill>
-              </a:uFill>
-              <a:latin typeface="Arial"/>
-            </a:endParaRPr>
-          </a:p>
-        </p:txBody>
-      </p:sp>
-      <p:pic>
-        <p:nvPicPr>
-          <p:cNvPr id="159" name="" descr=""/>
-          <p:cNvPicPr/>
+        <p:style>
+          <a:lnRef idx="0"/>
+          <a:fillRef idx="0"/>
+          <a:effectRef idx="0"/>
+          <a:fontRef idx="minor"/>
+        </p:style>
+      </p:sp>
+      <p:sp>
+        <p:nvSpPr>
+          <p:cNvPr id="190" name="CustomShape 5"/>
+          <p:cNvSpPr/>
           <p:nvPr/>
-        </p:nvPicPr>
-        <p:blipFill>
-          <a:blip r:embed="rId1"/>
-          <a:stretch/>
-        </p:blipFill>
-        <p:spPr>
-          <a:xfrm>
-            <a:off x="53280" y="1296000"/>
-            <a:ext cx="5958720" cy="4248000"/>
-          </a:xfrm>
-          <a:prstGeom prst="rect">
-            <a:avLst/>
-          </a:prstGeom>
-          <a:ln>
-            <a:noFill/>
-          </a:ln>
-        </p:spPr>
-      </p:pic>
-      <p:sp>
-        <p:nvSpPr>
-          <p:cNvPr id="160" name="TextShape 9"/>
-          <p:cNvSpPr txBox="1"/>
-          <p:nvPr/>
         </p:nvSpPr>
         <p:spPr>
           <a:xfrm>
             <a:off x="6624720" y="3181680"/>
-            <a:ext cx="3528000" cy="634320"/>
+            <a:ext cx="3527640" cy="633960"/>
           </a:xfrm>
           <a:prstGeom prst="rect">
             <a:avLst/>
@@ -10152,6 +11691,12 @@
             <a:noFill/>
           </a:ln>
         </p:spPr>
+        <p:style>
+          <a:lnRef idx="0"/>
+          <a:fillRef idx="0"/>
+          <a:effectRef idx="0"/>
+          <a:fontRef idx="minor"/>
+        </p:style>
         <p:txBody>
           <a:bodyPr lIns="90000" rIns="90000" tIns="45000" bIns="45000"/>
           <a:p>
@@ -10185,14 +11730,14 @@
       </p:sp>
       <p:sp>
         <p:nvSpPr>
-          <p:cNvPr id="161" name="TextShape 10"/>
-          <p:cNvSpPr txBox="1"/>
+          <p:cNvPr id="191" name="CustomShape 6"/>
+          <p:cNvSpPr/>
           <p:nvPr/>
         </p:nvSpPr>
         <p:spPr>
           <a:xfrm>
             <a:off x="6624720" y="3888000"/>
-            <a:ext cx="3456000" cy="576000"/>
+            <a:ext cx="3455640" cy="575640"/>
           </a:xfrm>
           <a:prstGeom prst="rect">
             <a:avLst/>
@@ -10202,6 +11747,12 @@
             <a:noFill/>
           </a:ln>
         </p:spPr>
+        <p:style>
+          <a:lnRef idx="0"/>
+          <a:fillRef idx="0"/>
+          <a:effectRef idx="0"/>
+          <a:fontRef idx="minor"/>
+        </p:style>
         <p:txBody>
           <a:bodyPr lIns="90000" rIns="90000" tIns="45000" bIns="45000"/>
           <a:p>
@@ -10217,7 +11768,7 @@
                 </a:uFill>
                 <a:latin typeface="Arial"/>
               </a:rPr>
-              <a:t>L’appel à la fonction permettant d’afficher les choix du menu</a:t>
+              <a:t>L’appel de la fonction permettant d’afficher les choix du menu</a:t>
             </a:r>
             <a:endParaRPr b="0" lang="fr-FR" sz="1500" spc="-1" strike="noStrike">
               <a:solidFill>
@@ -10235,14 +11786,14 @@
       </p:sp>
       <p:sp>
         <p:nvSpPr>
-          <p:cNvPr id="162" name="TextShape 11"/>
-          <p:cNvSpPr txBox="1"/>
+          <p:cNvPr id="192" name="CustomShape 7"/>
+          <p:cNvSpPr/>
           <p:nvPr/>
         </p:nvSpPr>
         <p:spPr>
           <a:xfrm>
             <a:off x="6588000" y="4716000"/>
-            <a:ext cx="3456000" cy="513720"/>
+            <a:ext cx="3455640" cy="513360"/>
           </a:xfrm>
           <a:prstGeom prst="rect">
             <a:avLst/>
@@ -10252,6 +11803,12 @@
             <a:noFill/>
           </a:ln>
         </p:spPr>
+        <p:style>
+          <a:lnRef idx="0"/>
+          <a:fillRef idx="0"/>
+          <a:effectRef idx="0"/>
+          <a:fontRef idx="minor"/>
+        </p:style>
         <p:txBody>
           <a:bodyPr lIns="90000" rIns="90000" tIns="45000" bIns="45000"/>
           <a:p>
@@ -10285,20 +11842,20 @@
       </p:sp>
       <p:sp>
         <p:nvSpPr>
-          <p:cNvPr id="163" name="CustomShape 12"/>
+          <p:cNvPr id="193" name="CustomShape 8"/>
           <p:cNvSpPr/>
           <p:nvPr/>
         </p:nvSpPr>
         <p:spPr>
           <a:xfrm>
             <a:off x="6120000" y="3312000"/>
-            <a:ext cx="432000" cy="216000"/>
+            <a:ext cx="431640" cy="215640"/>
           </a:xfrm>
           <a:custGeom>
             <a:avLst/>
             <a:gdLst/>
             <a:ahLst/>
-            <a:rect l="0" t="0" r="r" b="b"/>
+            <a:rect l="l" t="t" r="r" b="b"/>
             <a:pathLst>
               <a:path w="1202" h="602">
                 <a:moveTo>
@@ -10346,20 +11903,20 @@
       </p:sp>
       <p:sp>
         <p:nvSpPr>
-          <p:cNvPr id="164" name="CustomShape 13"/>
+          <p:cNvPr id="194" name="CustomShape 9"/>
           <p:cNvSpPr/>
           <p:nvPr/>
         </p:nvSpPr>
         <p:spPr>
           <a:xfrm>
-            <a:off x="6120000" y="3960000"/>
-            <a:ext cx="432000" cy="216000"/>
+            <a:off x="6120000" y="4068000"/>
+            <a:ext cx="431640" cy="215640"/>
           </a:xfrm>
           <a:custGeom>
             <a:avLst/>
             <a:gdLst/>
             <a:ahLst/>
-            <a:rect l="0" t="0" r="r" b="b"/>
+            <a:rect l="l" t="t" r="r" b="b"/>
             <a:pathLst>
               <a:path w="1202" h="602">
                 <a:moveTo>
@@ -10407,20 +11964,20 @@
       </p:sp>
       <p:sp>
         <p:nvSpPr>
-          <p:cNvPr id="165" name="CustomShape 14"/>
+          <p:cNvPr id="195" name="CustomShape 10"/>
           <p:cNvSpPr/>
           <p:nvPr/>
         </p:nvSpPr>
         <p:spPr>
           <a:xfrm>
             <a:off x="6120000" y="4752000"/>
-            <a:ext cx="432000" cy="216000"/>
+            <a:ext cx="431640" cy="215640"/>
           </a:xfrm>
           <a:custGeom>
             <a:avLst/>
             <a:gdLst/>
             <a:ahLst/>
-            <a:rect l="0" t="0" r="r" b="b"/>
+            <a:rect l="l" t="t" r="r" b="b"/>
             <a:pathLst>
               <a:path w="1202" h="602">
                 <a:moveTo>
@@ -11165,4 +12722,227 @@
     </a:fmtScheme>
   </a:themeElements>
 </a:theme>
+</file>
+
+<file path=ppt/theme/theme4.xml><?xml version="1.0" encoding="utf-8"?>
+<a:theme xmlns:a="http://schemas.openxmlformats.org/drawingml/2006/main" name="Office Theme">
+  <a:themeElements>
+    <a:clrScheme name="Office">
+      <a:dk1>
+        <a:sysClr val="windowText" lastClr="000000"/>
+      </a:dk1>
+      <a:lt1>
+        <a:sysClr val="window" lastClr="FFFFFF"/>
+      </a:lt1>
+      <a:dk2>
+        <a:srgbClr val="1F497D"/>
+      </a:dk2>
+      <a:lt2>
+        <a:srgbClr val="EEECE1"/>
+      </a:lt2>
+      <a:accent1>
+        <a:srgbClr val="4F81BD"/>
+      </a:accent1>
+      <a:accent2>
+        <a:srgbClr val="C0504D"/>
+      </a:accent2>
+      <a:accent3>
+        <a:srgbClr val="9BBB59"/>
+      </a:accent3>
+      <a:accent4>
+        <a:srgbClr val="8064A2"/>
+      </a:accent4>
+      <a:accent5>
+        <a:srgbClr val="4BACC6"/>
+      </a:accent5>
+      <a:accent6>
+        <a:srgbClr val="F79646"/>
+      </a:accent6>
+      <a:hlink>
+        <a:srgbClr val="0000FF"/>
+      </a:hlink>
+      <a:folHlink>
+        <a:srgbClr val="800080"/>
+      </a:folHlink>
+    </a:clrScheme>
+    <a:fontScheme name="Office">
+      <a:majorFont>
+        <a:latin typeface="Arial"/>
+        <a:ea typeface="DejaVu Sans"/>
+        <a:cs typeface="DejaVu Sans"/>
+      </a:majorFont>
+      <a:minorFont>
+        <a:latin typeface="Arial"/>
+        <a:ea typeface="DejaVu Sans"/>
+        <a:cs typeface="DejaVu Sans"/>
+      </a:minorFont>
+    </a:fontScheme>
+    <a:fmtScheme name="Office">
+      <a:fillStyleLst>
+        <a:solidFill>
+          <a:schemeClr val="phClr"/>
+        </a:solidFill>
+        <a:gradFill rotWithShape="1">
+          <a:gsLst>
+            <a:gs pos="0">
+              <a:schemeClr val="phClr">
+                <a:tint val="50000"/>
+                <a:satMod val="300000"/>
+              </a:schemeClr>
+            </a:gs>
+            <a:gs pos="35000">
+              <a:schemeClr val="phClr">
+                <a:tint val="37000"/>
+                <a:satMod val="300000"/>
+              </a:schemeClr>
+            </a:gs>
+            <a:gs pos="100000">
+              <a:schemeClr val="phClr">
+                <a:tint val="15000"/>
+                <a:satMod val="350000"/>
+              </a:schemeClr>
+            </a:gs>
+          </a:gsLst>
+          <a:lin ang="16200000" scaled="1"/>
+        </a:gradFill>
+        <a:gradFill rotWithShape="1">
+          <a:gsLst>
+            <a:gs pos="0">
+              <a:schemeClr val="phClr">
+                <a:shade val="51000"/>
+                <a:satMod val="130000"/>
+              </a:schemeClr>
+            </a:gs>
+            <a:gs pos="80000">
+              <a:schemeClr val="phClr">
+                <a:shade val="93000"/>
+                <a:satMod val="130000"/>
+              </a:schemeClr>
+            </a:gs>
+            <a:gs pos="100000">
+              <a:schemeClr val="phClr">
+                <a:shade val="94000"/>
+                <a:satMod val="135000"/>
+              </a:schemeClr>
+            </a:gs>
+          </a:gsLst>
+          <a:lin ang="16200000" scaled="0"/>
+        </a:gradFill>
+      </a:fillStyleLst>
+      <a:lnStyleLst>
+        <a:ln w="9525" cap="flat" cmpd="sng" algn="ctr">
+          <a:solidFill>
+            <a:schemeClr val="phClr">
+              <a:shade val="95000"/>
+              <a:satMod val="105000"/>
+            </a:schemeClr>
+          </a:solidFill>
+          <a:prstDash val="solid"/>
+        </a:ln>
+        <a:ln w="25400" cap="flat" cmpd="sng" algn="ctr">
+          <a:solidFill>
+            <a:schemeClr val="phClr"/>
+          </a:solidFill>
+          <a:prstDash val="solid"/>
+        </a:ln>
+        <a:ln w="38100" cap="flat" cmpd="sng" algn="ctr">
+          <a:solidFill>
+            <a:schemeClr val="phClr"/>
+          </a:solidFill>
+          <a:prstDash val="solid"/>
+        </a:ln>
+      </a:lnStyleLst>
+      <a:effectStyleLst>
+        <a:effectStyle>
+          <a:effectLst>
+            <a:outerShdw blurRad="40000" dist="20000" dir="5400000" rotWithShape="0">
+              <a:srgbClr val="000000">
+                <a:alpha val="38000"/>
+              </a:srgbClr>
+            </a:outerShdw>
+          </a:effectLst>
+        </a:effectStyle>
+        <a:effectStyle>
+          <a:effectLst>
+            <a:outerShdw blurRad="40000" dist="23000" dir="5400000" rotWithShape="0">
+              <a:srgbClr val="000000">
+                <a:alpha val="35000"/>
+              </a:srgbClr>
+            </a:outerShdw>
+          </a:effectLst>
+        </a:effectStyle>
+        <a:effectStyle>
+          <a:effectLst>
+            <a:outerShdw blurRad="40000" dist="23000" dir="5400000" rotWithShape="0">
+              <a:srgbClr val="000000">
+                <a:alpha val="35000"/>
+              </a:srgbClr>
+            </a:outerShdw>
+          </a:effectLst>
+          <a:scene3d>
+            <a:camera prst="orthographicFront">
+              <a:rot lat="0" lon="0" rev="0"/>
+            </a:camera>
+            <a:lightRig rig="threePt" dir="t">
+              <a:rot lat="0" lon="0" rev="1200000"/>
+            </a:lightRig>
+          </a:scene3d>
+          <a:sp3d>
+            <a:bevelT w="63500" h="25400"/>
+          </a:sp3d>
+        </a:effectStyle>
+      </a:effectStyleLst>
+      <a:bgFillStyleLst>
+        <a:solidFill>
+          <a:schemeClr val="phClr"/>
+        </a:solidFill>
+        <a:gradFill rotWithShape="1">
+          <a:gsLst>
+            <a:gs pos="0">
+              <a:schemeClr val="phClr">
+                <a:tint val="40000"/>
+                <a:satMod val="350000"/>
+              </a:schemeClr>
+            </a:gs>
+            <a:gs pos="40000">
+              <a:schemeClr val="phClr">
+                <a:tint val="45000"/>
+                <a:shade val="99000"/>
+                <a:satMod val="350000"/>
+              </a:schemeClr>
+            </a:gs>
+            <a:gs pos="100000">
+              <a:schemeClr val="phClr">
+                <a:shade val="20000"/>
+                <a:satMod val="255000"/>
+              </a:schemeClr>
+            </a:gs>
+          </a:gsLst>
+          <a:path path="circle">
+            <a:fillToRect l="50000" t="-80000" r="50000" b="180000"/>
+          </a:path>
+        </a:gradFill>
+        <a:gradFill rotWithShape="1">
+          <a:gsLst>
+            <a:gs pos="0">
+              <a:schemeClr val="phClr">
+                <a:tint val="80000"/>
+                <a:satMod val="300000"/>
+              </a:schemeClr>
+            </a:gs>
+            <a:gs pos="100000">
+              <a:schemeClr val="phClr">
+                <a:shade val="30000"/>
+                <a:satMod val="200000"/>
+              </a:schemeClr>
+            </a:gs>
+          </a:gsLst>
+          <a:path path="circle">
+            <a:fillToRect l="50000" t="50000" r="50000" b="50000"/>
+          </a:path>
+        </a:gradFill>
+      </a:bgFillStyleLst>
+    </a:fmtScheme>
+  </a:themeElements>
+</a:theme>
 </file>
</xml_diff>